<commit_message>
Prepare for review report 2
</commit_message>
<xml_diff>
--- a/Document/Report 2.pptx
+++ b/Document/Report 2.pptx
@@ -6,10 +6,35 @@
   </p:sldMasterIdLst>
   <p:sldIdLst>
     <p:sldId id="256" r:id="rId2"/>
-    <p:sldId id="257" r:id="rId3"/>
-    <p:sldId id="258" r:id="rId4"/>
-    <p:sldId id="259" r:id="rId5"/>
-    <p:sldId id="260" r:id="rId6"/>
+    <p:sldId id="284" r:id="rId3"/>
+    <p:sldId id="257" r:id="rId4"/>
+    <p:sldId id="258" r:id="rId5"/>
+    <p:sldId id="259" r:id="rId6"/>
+    <p:sldId id="261" r:id="rId7"/>
+    <p:sldId id="262" r:id="rId8"/>
+    <p:sldId id="264" r:id="rId9"/>
+    <p:sldId id="265" r:id="rId10"/>
+    <p:sldId id="266" r:id="rId11"/>
+    <p:sldId id="267" r:id="rId12"/>
+    <p:sldId id="268" r:id="rId13"/>
+    <p:sldId id="269" r:id="rId14"/>
+    <p:sldId id="270" r:id="rId15"/>
+    <p:sldId id="271" r:id="rId16"/>
+    <p:sldId id="272" r:id="rId17"/>
+    <p:sldId id="273" r:id="rId18"/>
+    <p:sldId id="274" r:id="rId19"/>
+    <p:sldId id="275" r:id="rId20"/>
+    <p:sldId id="276" r:id="rId21"/>
+    <p:sldId id="277" r:id="rId22"/>
+    <p:sldId id="278" r:id="rId23"/>
+    <p:sldId id="279" r:id="rId24"/>
+    <p:sldId id="280" r:id="rId25"/>
+    <p:sldId id="281" r:id="rId26"/>
+    <p:sldId id="282" r:id="rId27"/>
+    <p:sldId id="283" r:id="rId28"/>
+    <p:sldId id="285" r:id="rId29"/>
+    <p:sldId id="286" r:id="rId30"/>
+    <p:sldId id="287" r:id="rId31"/>
   </p:sldIdLst>
   <p:sldSz cx="12192000" cy="6858000"/>
   <p:notesSz cx="6858000" cy="9144000"/>
@@ -247,7 +272,7 @@
           <a:p>
             <a:fld id="{F45A93F3-C1EE-4E58-8E7B-089555F074C2}" type="datetimeFigureOut">
               <a:rPr lang="en-US" smtClean="0"/>
-              <a:t>Friday 05/04/2018</a:t>
+              <a:t>Monday 05/07/2018</a:t>
             </a:fld>
             <a:endParaRPr lang="en-US"/>
           </a:p>
@@ -417,7 +442,7 @@
           <a:p>
             <a:fld id="{F45A93F3-C1EE-4E58-8E7B-089555F074C2}" type="datetimeFigureOut">
               <a:rPr lang="en-US" smtClean="0"/>
-              <a:t>Friday 05/04/2018</a:t>
+              <a:t>Monday 05/07/2018</a:t>
             </a:fld>
             <a:endParaRPr lang="en-US"/>
           </a:p>
@@ -597,7 +622,7 @@
           <a:p>
             <a:fld id="{F45A93F3-C1EE-4E58-8E7B-089555F074C2}" type="datetimeFigureOut">
               <a:rPr lang="en-US" smtClean="0"/>
-              <a:t>Friday 05/04/2018</a:t>
+              <a:t>Monday 05/07/2018</a:t>
             </a:fld>
             <a:endParaRPr lang="en-US"/>
           </a:p>
@@ -767,7 +792,7 @@
           <a:p>
             <a:fld id="{F45A93F3-C1EE-4E58-8E7B-089555F074C2}" type="datetimeFigureOut">
               <a:rPr lang="en-US" smtClean="0"/>
-              <a:t>Friday 05/04/2018</a:t>
+              <a:t>Monday 05/07/2018</a:t>
             </a:fld>
             <a:endParaRPr lang="en-US"/>
           </a:p>
@@ -1013,7 +1038,7 @@
           <a:p>
             <a:fld id="{F45A93F3-C1EE-4E58-8E7B-089555F074C2}" type="datetimeFigureOut">
               <a:rPr lang="en-US" smtClean="0"/>
-              <a:t>Friday 05/04/2018</a:t>
+              <a:t>Monday 05/07/2018</a:t>
             </a:fld>
             <a:endParaRPr lang="en-US"/>
           </a:p>
@@ -1245,7 +1270,7 @@
           <a:p>
             <a:fld id="{F45A93F3-C1EE-4E58-8E7B-089555F074C2}" type="datetimeFigureOut">
               <a:rPr lang="en-US" smtClean="0"/>
-              <a:t>Friday 05/04/2018</a:t>
+              <a:t>Monday 05/07/2018</a:t>
             </a:fld>
             <a:endParaRPr lang="en-US"/>
           </a:p>
@@ -1612,7 +1637,7 @@
           <a:p>
             <a:fld id="{F45A93F3-C1EE-4E58-8E7B-089555F074C2}" type="datetimeFigureOut">
               <a:rPr lang="en-US" smtClean="0"/>
-              <a:t>Friday 05/04/2018</a:t>
+              <a:t>Monday 05/07/2018</a:t>
             </a:fld>
             <a:endParaRPr lang="en-US"/>
           </a:p>
@@ -1730,7 +1755,7 @@
           <a:p>
             <a:fld id="{F45A93F3-C1EE-4E58-8E7B-089555F074C2}" type="datetimeFigureOut">
               <a:rPr lang="en-US" smtClean="0"/>
-              <a:t>Friday 05/04/2018</a:t>
+              <a:t>Monday 05/07/2018</a:t>
             </a:fld>
             <a:endParaRPr lang="en-US"/>
           </a:p>
@@ -1825,7 +1850,7 @@
           <a:p>
             <a:fld id="{F45A93F3-C1EE-4E58-8E7B-089555F074C2}" type="datetimeFigureOut">
               <a:rPr lang="en-US" smtClean="0"/>
-              <a:t>Friday 05/04/2018</a:t>
+              <a:t>Monday 05/07/2018</a:t>
             </a:fld>
             <a:endParaRPr lang="en-US"/>
           </a:p>
@@ -2102,7 +2127,7 @@
           <a:p>
             <a:fld id="{F45A93F3-C1EE-4E58-8E7B-089555F074C2}" type="datetimeFigureOut">
               <a:rPr lang="en-US" smtClean="0"/>
-              <a:t>Friday 05/04/2018</a:t>
+              <a:t>Monday 05/07/2018</a:t>
             </a:fld>
             <a:endParaRPr lang="en-US"/>
           </a:p>
@@ -2355,7 +2380,7 @@
           <a:p>
             <a:fld id="{F45A93F3-C1EE-4E58-8E7B-089555F074C2}" type="datetimeFigureOut">
               <a:rPr lang="en-US" smtClean="0"/>
-              <a:t>Friday 05/04/2018</a:t>
+              <a:t>Monday 05/07/2018</a:t>
             </a:fld>
             <a:endParaRPr lang="en-US"/>
           </a:p>
@@ -2568,7 +2593,7 @@
           <a:p>
             <a:fld id="{F45A93F3-C1EE-4E58-8E7B-089555F074C2}" type="datetimeFigureOut">
               <a:rPr lang="en-US" smtClean="0"/>
-              <a:t>Friday 05/04/2018</a:t>
+              <a:t>Monday 05/07/2018</a:t>
             </a:fld>
             <a:endParaRPr lang="en-US"/>
           </a:p>
@@ -3015,7 +3040,6 @@
               <a:rPr lang="en-US" dirty="0"/>
               <a:t>Customization in Dynamics 365</a:t>
             </a:r>
-            <a:endParaRPr lang="en-US" dirty="0"/>
           </a:p>
         </p:txBody>
       </p:sp>
@@ -3023,6 +3047,1048 @@
     <p:extLst>
       <p:ext uri="{BB962C8B-B14F-4D97-AF65-F5344CB8AC3E}">
         <p14:creationId xmlns:p14="http://schemas.microsoft.com/office/powerpoint/2010/main" val="3574862750"/>
+      </p:ext>
+    </p:extLst>
+  </p:cSld>
+  <p:clrMapOvr>
+    <a:masterClrMapping/>
+  </p:clrMapOvr>
+</p:sld>
+</file>
+
+<file path=ppt/slides/slide10.xml><?xml version="1.0" encoding="utf-8"?>
+<p:sld xmlns:a="http://schemas.openxmlformats.org/drawingml/2006/main" xmlns:r="http://schemas.openxmlformats.org/officeDocument/2006/relationships" xmlns:p="http://schemas.openxmlformats.org/presentationml/2006/main">
+  <p:cSld>
+    <p:spTree>
+      <p:nvGrpSpPr>
+        <p:cNvPr id="1" name=""/>
+        <p:cNvGrpSpPr/>
+        <p:nvPr/>
+      </p:nvGrpSpPr>
+      <p:grpSpPr>
+        <a:xfrm>
+          <a:off x="0" y="0"/>
+          <a:ext cx="0" cy="0"/>
+          <a:chOff x="0" y="0"/>
+          <a:chExt cx="0" cy="0"/>
+        </a:xfrm>
+      </p:grpSpPr>
+      <p:sp>
+        <p:nvSpPr>
+          <p:cNvPr id="2" name="Title 1"/>
+          <p:cNvSpPr>
+            <a:spLocks noGrp="1"/>
+          </p:cNvSpPr>
+          <p:nvPr>
+            <p:ph type="title"/>
+          </p:nvPr>
+        </p:nvSpPr>
+        <p:spPr/>
+        <p:txBody>
+          <a:bodyPr/>
+          <a:lstStyle/>
+          <a:p>
+            <a:r>
+              <a:rPr lang="en-US" dirty="0" smtClean="0"/>
+              <a:t>Type of Entities</a:t>
+            </a:r>
+            <a:endParaRPr lang="en-US" dirty="0"/>
+          </a:p>
+        </p:txBody>
+      </p:sp>
+      <p:sp>
+        <p:nvSpPr>
+          <p:cNvPr id="3" name="Content Placeholder 2"/>
+          <p:cNvSpPr>
+            <a:spLocks noGrp="1"/>
+          </p:cNvSpPr>
+          <p:nvPr>
+            <p:ph idx="1"/>
+          </p:nvPr>
+        </p:nvSpPr>
+        <p:spPr/>
+        <p:txBody>
+          <a:bodyPr/>
+          <a:lstStyle/>
+          <a:p>
+            <a:r>
+              <a:rPr lang="en-US" dirty="0" smtClean="0"/>
+              <a:t>Normal entity.</a:t>
+            </a:r>
+          </a:p>
+          <a:p>
+            <a:r>
+              <a:rPr lang="en-US" dirty="0" smtClean="0"/>
+              <a:t>Activity entity: can’t be displayed on menu, ha time dimension.</a:t>
+            </a:r>
+          </a:p>
+          <a:p>
+            <a:r>
+              <a:rPr lang="en-US" dirty="0" smtClean="0"/>
+              <a:t>Virtual entity: fields from external data source.</a:t>
+            </a:r>
+          </a:p>
+          <a:p>
+            <a:pPr lvl="1">
+              <a:buFont typeface="Courier New" panose="02070309020205020404" pitchFamily="49" charset="0"/>
+              <a:buChar char="o"/>
+            </a:pPr>
+            <a:r>
+              <a:rPr lang="en-US" dirty="0" smtClean="0"/>
+              <a:t>External Name: name of the table in external data source.</a:t>
+            </a:r>
+          </a:p>
+          <a:p>
+            <a:pPr lvl="1">
+              <a:buFont typeface="Courier New" panose="02070309020205020404" pitchFamily="49" charset="0"/>
+              <a:buChar char="o"/>
+            </a:pPr>
+            <a:r>
+              <a:rPr lang="en-US" dirty="0" smtClean="0"/>
+              <a:t>External Collection Name: plural name of the table in external data source.</a:t>
+            </a:r>
+          </a:p>
+          <a:p>
+            <a:pPr lvl="1">
+              <a:buFont typeface="Courier New" panose="02070309020205020404" pitchFamily="49" charset="0"/>
+              <a:buChar char="o"/>
+            </a:pPr>
+            <a:r>
+              <a:rPr lang="en-US" dirty="0" smtClean="0"/>
+              <a:t>Read-only, no auditing &amp; change tracking, can’t be activity type, no rollup and calculated field.</a:t>
+            </a:r>
+          </a:p>
+        </p:txBody>
+      </p:sp>
+    </p:spTree>
+    <p:extLst>
+      <p:ext uri="{BB962C8B-B14F-4D97-AF65-F5344CB8AC3E}">
+        <p14:creationId xmlns:p14="http://schemas.microsoft.com/office/powerpoint/2010/main" val="2777502246"/>
+      </p:ext>
+    </p:extLst>
+  </p:cSld>
+  <p:clrMapOvr>
+    <a:masterClrMapping/>
+  </p:clrMapOvr>
+</p:sld>
+</file>
+
+<file path=ppt/slides/slide11.xml><?xml version="1.0" encoding="utf-8"?>
+<p:sld xmlns:a="http://schemas.openxmlformats.org/drawingml/2006/main" xmlns:r="http://schemas.openxmlformats.org/officeDocument/2006/relationships" xmlns:p="http://schemas.openxmlformats.org/presentationml/2006/main">
+  <p:cSld>
+    <p:spTree>
+      <p:nvGrpSpPr>
+        <p:cNvPr id="1" name=""/>
+        <p:cNvGrpSpPr/>
+        <p:nvPr/>
+      </p:nvGrpSpPr>
+      <p:grpSpPr>
+        <a:xfrm>
+          <a:off x="0" y="0"/>
+          <a:ext cx="0" cy="0"/>
+          <a:chOff x="0" y="0"/>
+          <a:chExt cx="0" cy="0"/>
+        </a:xfrm>
+      </p:grpSpPr>
+      <p:sp>
+        <p:nvSpPr>
+          <p:cNvPr id="2" name="Title 1"/>
+          <p:cNvSpPr>
+            <a:spLocks noGrp="1"/>
+          </p:cNvSpPr>
+          <p:nvPr>
+            <p:ph type="title"/>
+          </p:nvPr>
+        </p:nvSpPr>
+        <p:spPr/>
+        <p:txBody>
+          <a:bodyPr/>
+          <a:lstStyle/>
+          <a:p>
+            <a:r>
+              <a:rPr lang="en-US" dirty="0" smtClean="0"/>
+              <a:t>Key Options</a:t>
+            </a:r>
+            <a:endParaRPr lang="en-US" dirty="0"/>
+          </a:p>
+        </p:txBody>
+      </p:sp>
+      <p:sp>
+        <p:nvSpPr>
+          <p:cNvPr id="3" name="Content Placeholder 2"/>
+          <p:cNvSpPr>
+            <a:spLocks noGrp="1"/>
+          </p:cNvSpPr>
+          <p:nvPr>
+            <p:ph idx="1"/>
+          </p:nvPr>
+        </p:nvSpPr>
+        <p:spPr/>
+        <p:txBody>
+          <a:bodyPr/>
+          <a:lstStyle/>
+          <a:p>
+            <a:r>
+              <a:rPr lang="en-US" dirty="0"/>
+              <a:t>Areas that display this </a:t>
+            </a:r>
+            <a:r>
+              <a:rPr lang="en-US" dirty="0" smtClean="0"/>
+              <a:t>entity.</a:t>
+            </a:r>
+          </a:p>
+          <a:p>
+            <a:r>
+              <a:rPr lang="en-US" dirty="0" smtClean="0"/>
+              <a:t>Primary Field: name of entity, can’t be changed, must be Single Line of Text, format must be Text.</a:t>
+            </a:r>
+          </a:p>
+          <a:p>
+            <a:r>
+              <a:rPr lang="en-US" dirty="0" smtClean="0"/>
+              <a:t>Data Service:</a:t>
+            </a:r>
+          </a:p>
+          <a:p>
+            <a:pPr lvl="1">
+              <a:buFont typeface="Courier New" panose="02070309020205020404" pitchFamily="49" charset="0"/>
+              <a:buChar char="o"/>
+            </a:pPr>
+            <a:r>
+              <a:rPr lang="en-US" dirty="0" smtClean="0"/>
+              <a:t>Allow Quick Create: require Quick Create Form.</a:t>
+            </a:r>
+            <a:endParaRPr lang="en-US" dirty="0"/>
+          </a:p>
+        </p:txBody>
+      </p:sp>
+    </p:spTree>
+    <p:extLst>
+      <p:ext uri="{BB962C8B-B14F-4D97-AF65-F5344CB8AC3E}">
+        <p14:creationId xmlns:p14="http://schemas.microsoft.com/office/powerpoint/2010/main" val="120488373"/>
+      </p:ext>
+    </p:extLst>
+  </p:cSld>
+  <p:clrMapOvr>
+    <a:masterClrMapping/>
+  </p:clrMapOvr>
+</p:sld>
+</file>
+
+<file path=ppt/slides/slide12.xml><?xml version="1.0" encoding="utf-8"?>
+<p:sld xmlns:a="http://schemas.openxmlformats.org/drawingml/2006/main" xmlns:r="http://schemas.openxmlformats.org/officeDocument/2006/relationships" xmlns:p="http://schemas.openxmlformats.org/presentationml/2006/main">
+  <p:cSld>
+    <p:spTree>
+      <p:nvGrpSpPr>
+        <p:cNvPr id="1" name=""/>
+        <p:cNvGrpSpPr/>
+        <p:nvPr/>
+      </p:nvGrpSpPr>
+      <p:grpSpPr>
+        <a:xfrm>
+          <a:off x="0" y="0"/>
+          <a:ext cx="0" cy="0"/>
+          <a:chOff x="0" y="0"/>
+          <a:chExt cx="0" cy="0"/>
+        </a:xfrm>
+      </p:grpSpPr>
+      <p:sp>
+        <p:nvSpPr>
+          <p:cNvPr id="2" name="Title 1"/>
+          <p:cNvSpPr>
+            <a:spLocks noGrp="1"/>
+          </p:cNvSpPr>
+          <p:nvPr>
+            <p:ph type="title"/>
+          </p:nvPr>
+        </p:nvSpPr>
+        <p:spPr/>
+        <p:txBody>
+          <a:bodyPr/>
+          <a:lstStyle/>
+          <a:p>
+            <a:r>
+              <a:rPr lang="en-US" dirty="0" smtClean="0"/>
+              <a:t>Entity for Phone</a:t>
+            </a:r>
+            <a:endParaRPr lang="en-US" dirty="0"/>
+          </a:p>
+        </p:txBody>
+      </p:sp>
+      <p:sp>
+        <p:nvSpPr>
+          <p:cNvPr id="3" name="Content Placeholder 2"/>
+          <p:cNvSpPr>
+            <a:spLocks noGrp="1"/>
+          </p:cNvSpPr>
+          <p:nvPr>
+            <p:ph idx="1"/>
+          </p:nvPr>
+        </p:nvSpPr>
+        <p:spPr/>
+        <p:txBody>
+          <a:bodyPr/>
+          <a:lstStyle/>
+          <a:p>
+            <a:r>
+              <a:rPr lang="en-US" dirty="0" smtClean="0"/>
+              <a:t>Hide/show entity on Phone.</a:t>
+            </a:r>
+          </a:p>
+          <a:p>
+            <a:r>
+              <a:rPr lang="en-US" dirty="0" smtClean="0"/>
+              <a:t>Step 1: Select an entity.</a:t>
+            </a:r>
+          </a:p>
+          <a:p>
+            <a:r>
+              <a:rPr lang="en-US" dirty="0" smtClean="0"/>
+              <a:t>Step 2: Change Outlook &amp; Mobile setting.</a:t>
+            </a:r>
+          </a:p>
+          <a:p>
+            <a:pPr lvl="1">
+              <a:buFont typeface="Courier New" panose="02070309020205020404" pitchFamily="49" charset="0"/>
+              <a:buChar char="o"/>
+            </a:pPr>
+            <a:r>
+              <a:rPr lang="en-US" dirty="0" smtClean="0"/>
+              <a:t>Enable for phone express: enable this entity on previous version of Dynamics 365 for phone.</a:t>
+            </a:r>
+          </a:p>
+          <a:p>
+            <a:pPr lvl="1">
+              <a:buFont typeface="Courier New" panose="02070309020205020404" pitchFamily="49" charset="0"/>
+              <a:buChar char="o"/>
+            </a:pPr>
+            <a:r>
+              <a:rPr lang="en-US" dirty="0" smtClean="0"/>
+              <a:t>Enable for mobile.</a:t>
+            </a:r>
+          </a:p>
+          <a:p>
+            <a:pPr lvl="1">
+              <a:buFont typeface="Courier New" panose="02070309020205020404" pitchFamily="49" charset="0"/>
+              <a:buChar char="o"/>
+            </a:pPr>
+            <a:r>
+              <a:rPr lang="en-US" dirty="0" smtClean="0"/>
+              <a:t>Read-only in mobile.</a:t>
+            </a:r>
+            <a:endParaRPr lang="en-US" dirty="0"/>
+          </a:p>
+        </p:txBody>
+      </p:sp>
+    </p:spTree>
+    <p:extLst>
+      <p:ext uri="{BB962C8B-B14F-4D97-AF65-F5344CB8AC3E}">
+        <p14:creationId xmlns:p14="http://schemas.microsoft.com/office/powerpoint/2010/main" val="2570335760"/>
+      </p:ext>
+    </p:extLst>
+  </p:cSld>
+  <p:clrMapOvr>
+    <a:masterClrMapping/>
+  </p:clrMapOvr>
+</p:sld>
+</file>
+
+<file path=ppt/slides/slide13.xml><?xml version="1.0" encoding="utf-8"?>
+<p:sld xmlns:a="http://schemas.openxmlformats.org/drawingml/2006/main" xmlns:r="http://schemas.openxmlformats.org/officeDocument/2006/relationships" xmlns:p="http://schemas.openxmlformats.org/presentationml/2006/main">
+  <p:cSld>
+    <p:spTree>
+      <p:nvGrpSpPr>
+        <p:cNvPr id="1" name=""/>
+        <p:cNvGrpSpPr/>
+        <p:nvPr/>
+      </p:nvGrpSpPr>
+      <p:grpSpPr>
+        <a:xfrm>
+          <a:off x="0" y="0"/>
+          <a:ext cx="0" cy="0"/>
+          <a:chOff x="0" y="0"/>
+          <a:chExt cx="0" cy="0"/>
+        </a:xfrm>
+      </p:grpSpPr>
+      <p:sp>
+        <p:nvSpPr>
+          <p:cNvPr id="2" name="Title 1"/>
+          <p:cNvSpPr>
+            <a:spLocks noGrp="1"/>
+          </p:cNvSpPr>
+          <p:nvPr>
+            <p:ph type="title"/>
+          </p:nvPr>
+        </p:nvSpPr>
+        <p:spPr/>
+        <p:txBody>
+          <a:bodyPr/>
+          <a:lstStyle/>
+          <a:p>
+            <a:r>
+              <a:rPr lang="en-US" dirty="0" smtClean="0"/>
+              <a:t>Customizing Forms</a:t>
+            </a:r>
+            <a:endParaRPr lang="en-US" dirty="0"/>
+          </a:p>
+        </p:txBody>
+      </p:sp>
+      <p:sp>
+        <p:nvSpPr>
+          <p:cNvPr id="3" name="Content Placeholder 2"/>
+          <p:cNvSpPr>
+            <a:spLocks noGrp="1"/>
+          </p:cNvSpPr>
+          <p:nvPr>
+            <p:ph idx="1"/>
+          </p:nvPr>
+        </p:nvSpPr>
+        <p:spPr/>
+        <p:txBody>
+          <a:bodyPr/>
+          <a:lstStyle/>
+          <a:p>
+            <a:r>
+              <a:rPr lang="en-US" dirty="0" smtClean="0"/>
+              <a:t>Types of form.</a:t>
+            </a:r>
+          </a:p>
+          <a:p>
+            <a:r>
+              <a:rPr lang="en-US" dirty="0" smtClean="0"/>
+              <a:t>Structure of a form.</a:t>
+            </a:r>
+          </a:p>
+          <a:p>
+            <a:r>
+              <a:rPr lang="en-US" dirty="0" smtClean="0"/>
+              <a:t>Key options.</a:t>
+            </a:r>
+          </a:p>
+          <a:p>
+            <a:r>
+              <a:rPr lang="en-US" dirty="0" smtClean="0"/>
+              <a:t>Design form for phone.</a:t>
+            </a:r>
+          </a:p>
+        </p:txBody>
+      </p:sp>
+    </p:spTree>
+    <p:extLst>
+      <p:ext uri="{BB962C8B-B14F-4D97-AF65-F5344CB8AC3E}">
+        <p14:creationId xmlns:p14="http://schemas.microsoft.com/office/powerpoint/2010/main" val="1568707658"/>
+      </p:ext>
+    </p:extLst>
+  </p:cSld>
+  <p:clrMapOvr>
+    <a:masterClrMapping/>
+  </p:clrMapOvr>
+</p:sld>
+</file>
+
+<file path=ppt/slides/slide14.xml><?xml version="1.0" encoding="utf-8"?>
+<p:sld xmlns:a="http://schemas.openxmlformats.org/drawingml/2006/main" xmlns:r="http://schemas.openxmlformats.org/officeDocument/2006/relationships" xmlns:p="http://schemas.openxmlformats.org/presentationml/2006/main">
+  <p:cSld>
+    <p:spTree>
+      <p:nvGrpSpPr>
+        <p:cNvPr id="1" name=""/>
+        <p:cNvGrpSpPr/>
+        <p:nvPr/>
+      </p:nvGrpSpPr>
+      <p:grpSpPr>
+        <a:xfrm>
+          <a:off x="0" y="0"/>
+          <a:ext cx="0" cy="0"/>
+          <a:chOff x="0" y="0"/>
+          <a:chExt cx="0" cy="0"/>
+        </a:xfrm>
+      </p:grpSpPr>
+      <p:sp>
+        <p:nvSpPr>
+          <p:cNvPr id="2" name="Title 1"/>
+          <p:cNvSpPr>
+            <a:spLocks noGrp="1"/>
+          </p:cNvSpPr>
+          <p:nvPr>
+            <p:ph type="title"/>
+          </p:nvPr>
+        </p:nvSpPr>
+        <p:spPr/>
+        <p:txBody>
+          <a:bodyPr/>
+          <a:lstStyle/>
+          <a:p>
+            <a:r>
+              <a:rPr lang="en-US" dirty="0" smtClean="0"/>
+              <a:t>Types of Form</a:t>
+            </a:r>
+            <a:endParaRPr lang="en-US" dirty="0"/>
+          </a:p>
+        </p:txBody>
+      </p:sp>
+      <p:sp>
+        <p:nvSpPr>
+          <p:cNvPr id="3" name="Content Placeholder 2"/>
+          <p:cNvSpPr>
+            <a:spLocks noGrp="1"/>
+          </p:cNvSpPr>
+          <p:nvPr>
+            <p:ph idx="1"/>
+          </p:nvPr>
+        </p:nvSpPr>
+        <p:spPr/>
+        <p:txBody>
+          <a:bodyPr/>
+          <a:lstStyle/>
+          <a:p>
+            <a:r>
+              <a:rPr lang="en-US" dirty="0" smtClean="0"/>
+              <a:t>Main: interact with entity data.</a:t>
+            </a:r>
+          </a:p>
+          <a:p>
+            <a:r>
+              <a:rPr lang="en-US" dirty="0" smtClean="0"/>
+              <a:t>Card: for reading purpose only.</a:t>
+            </a:r>
+          </a:p>
+          <a:p>
+            <a:r>
+              <a:rPr lang="en-US" dirty="0" smtClean="0"/>
+              <a:t>Quick Create: update &amp; create entity with limited fields.</a:t>
+            </a:r>
+          </a:p>
+          <a:p>
+            <a:r>
+              <a:rPr lang="en-US" dirty="0" smtClean="0"/>
+              <a:t>Quick View: display additional data.</a:t>
+            </a:r>
+            <a:endParaRPr lang="en-US" dirty="0"/>
+          </a:p>
+        </p:txBody>
+      </p:sp>
+    </p:spTree>
+    <p:extLst>
+      <p:ext uri="{BB962C8B-B14F-4D97-AF65-F5344CB8AC3E}">
+        <p14:creationId xmlns:p14="http://schemas.microsoft.com/office/powerpoint/2010/main" val="2488249775"/>
+      </p:ext>
+    </p:extLst>
+  </p:cSld>
+  <p:clrMapOvr>
+    <a:masterClrMapping/>
+  </p:clrMapOvr>
+</p:sld>
+</file>
+
+<file path=ppt/slides/slide15.xml><?xml version="1.0" encoding="utf-8"?>
+<p:sld xmlns:a="http://schemas.openxmlformats.org/drawingml/2006/main" xmlns:r="http://schemas.openxmlformats.org/officeDocument/2006/relationships" xmlns:p="http://schemas.openxmlformats.org/presentationml/2006/main">
+  <p:cSld>
+    <p:spTree>
+      <p:nvGrpSpPr>
+        <p:cNvPr id="1" name=""/>
+        <p:cNvGrpSpPr/>
+        <p:nvPr/>
+      </p:nvGrpSpPr>
+      <p:grpSpPr>
+        <a:xfrm>
+          <a:off x="0" y="0"/>
+          <a:ext cx="0" cy="0"/>
+          <a:chOff x="0" y="0"/>
+          <a:chExt cx="0" cy="0"/>
+        </a:xfrm>
+      </p:grpSpPr>
+      <p:sp>
+        <p:nvSpPr>
+          <p:cNvPr id="2" name="Title 1"/>
+          <p:cNvSpPr>
+            <a:spLocks noGrp="1"/>
+          </p:cNvSpPr>
+          <p:nvPr>
+            <p:ph type="title"/>
+          </p:nvPr>
+        </p:nvSpPr>
+        <p:spPr/>
+        <p:txBody>
+          <a:bodyPr/>
+          <a:lstStyle/>
+          <a:p>
+            <a:r>
+              <a:rPr lang="en-US" dirty="0" smtClean="0"/>
+              <a:t>Structure of a Form</a:t>
+            </a:r>
+            <a:endParaRPr lang="en-US" dirty="0"/>
+          </a:p>
+        </p:txBody>
+      </p:sp>
+      <p:sp>
+        <p:nvSpPr>
+          <p:cNvPr id="3" name="Content Placeholder 2"/>
+          <p:cNvSpPr>
+            <a:spLocks noGrp="1"/>
+          </p:cNvSpPr>
+          <p:nvPr>
+            <p:ph idx="1"/>
+          </p:nvPr>
+        </p:nvSpPr>
+        <p:spPr/>
+        <p:txBody>
+          <a:bodyPr/>
+          <a:lstStyle/>
+          <a:p>
+            <a:r>
+              <a:rPr lang="en-US" dirty="0" smtClean="0"/>
+              <a:t>Header: some key fields. Cannot be removed.</a:t>
+            </a:r>
+          </a:p>
+          <a:p>
+            <a:r>
+              <a:rPr lang="en-US" dirty="0" smtClean="0"/>
+              <a:t>Body: Can have multiple tabs, must have at least one tab.</a:t>
+            </a:r>
+          </a:p>
+          <a:p>
+            <a:r>
+              <a:rPr lang="en-US" dirty="0" smtClean="0"/>
+              <a:t>Footer: some key fields.  Cannot be removed.</a:t>
+            </a:r>
+            <a:endParaRPr lang="en-US" dirty="0"/>
+          </a:p>
+        </p:txBody>
+      </p:sp>
+    </p:spTree>
+    <p:extLst>
+      <p:ext uri="{BB962C8B-B14F-4D97-AF65-F5344CB8AC3E}">
+        <p14:creationId xmlns:p14="http://schemas.microsoft.com/office/powerpoint/2010/main" val="1530565837"/>
+      </p:ext>
+    </p:extLst>
+  </p:cSld>
+  <p:clrMapOvr>
+    <a:masterClrMapping/>
+  </p:clrMapOvr>
+</p:sld>
+</file>
+
+<file path=ppt/slides/slide16.xml><?xml version="1.0" encoding="utf-8"?>
+<p:sld xmlns:a="http://schemas.openxmlformats.org/drawingml/2006/main" xmlns:r="http://schemas.openxmlformats.org/officeDocument/2006/relationships" xmlns:p="http://schemas.openxmlformats.org/presentationml/2006/main">
+  <p:cSld>
+    <p:spTree>
+      <p:nvGrpSpPr>
+        <p:cNvPr id="1" name=""/>
+        <p:cNvGrpSpPr/>
+        <p:nvPr/>
+      </p:nvGrpSpPr>
+      <p:grpSpPr>
+        <a:xfrm>
+          <a:off x="0" y="0"/>
+          <a:ext cx="0" cy="0"/>
+          <a:chOff x="0" y="0"/>
+          <a:chExt cx="0" cy="0"/>
+        </a:xfrm>
+      </p:grpSpPr>
+      <p:sp>
+        <p:nvSpPr>
+          <p:cNvPr id="2" name="Title 1"/>
+          <p:cNvSpPr>
+            <a:spLocks noGrp="1"/>
+          </p:cNvSpPr>
+          <p:nvPr>
+            <p:ph type="title"/>
+          </p:nvPr>
+        </p:nvSpPr>
+        <p:spPr/>
+        <p:txBody>
+          <a:bodyPr/>
+          <a:lstStyle/>
+          <a:p>
+            <a:r>
+              <a:rPr lang="en-US" dirty="0" smtClean="0"/>
+              <a:t>Key Options</a:t>
+            </a:r>
+            <a:endParaRPr lang="en-US" dirty="0"/>
+          </a:p>
+        </p:txBody>
+      </p:sp>
+      <p:sp>
+        <p:nvSpPr>
+          <p:cNvPr id="3" name="Content Placeholder 2"/>
+          <p:cNvSpPr>
+            <a:spLocks noGrp="1"/>
+          </p:cNvSpPr>
+          <p:nvPr>
+            <p:ph idx="1"/>
+          </p:nvPr>
+        </p:nvSpPr>
+        <p:spPr/>
+        <p:txBody>
+          <a:bodyPr/>
+          <a:lstStyle/>
+          <a:p>
+            <a:r>
+              <a:rPr lang="en-US" dirty="0" smtClean="0"/>
+              <a:t>Form Order: set default form when user created multiple main/quick create/mobile forms for an entity.</a:t>
+            </a:r>
+          </a:p>
+          <a:p>
+            <a:r>
+              <a:rPr lang="en-US" dirty="0" smtClean="0"/>
+              <a:t>Enable Security Role: allow or restrict people from access certain form. Can only apply for main forms.</a:t>
+            </a:r>
+          </a:p>
+        </p:txBody>
+      </p:sp>
+    </p:spTree>
+    <p:extLst>
+      <p:ext uri="{BB962C8B-B14F-4D97-AF65-F5344CB8AC3E}">
+        <p14:creationId xmlns:p14="http://schemas.microsoft.com/office/powerpoint/2010/main" val="442689207"/>
+      </p:ext>
+    </p:extLst>
+  </p:cSld>
+  <p:clrMapOvr>
+    <a:masterClrMapping/>
+  </p:clrMapOvr>
+</p:sld>
+</file>
+
+<file path=ppt/slides/slide17.xml><?xml version="1.0" encoding="utf-8"?>
+<p:sld xmlns:a="http://schemas.openxmlformats.org/drawingml/2006/main" xmlns:r="http://schemas.openxmlformats.org/officeDocument/2006/relationships" xmlns:p="http://schemas.openxmlformats.org/presentationml/2006/main">
+  <p:cSld>
+    <p:spTree>
+      <p:nvGrpSpPr>
+        <p:cNvPr id="1" name=""/>
+        <p:cNvGrpSpPr/>
+        <p:nvPr/>
+      </p:nvGrpSpPr>
+      <p:grpSpPr>
+        <a:xfrm>
+          <a:off x="0" y="0"/>
+          <a:ext cx="0" cy="0"/>
+          <a:chOff x="0" y="0"/>
+          <a:chExt cx="0" cy="0"/>
+        </a:xfrm>
+      </p:grpSpPr>
+      <p:sp>
+        <p:nvSpPr>
+          <p:cNvPr id="2" name="Title 1"/>
+          <p:cNvSpPr>
+            <a:spLocks noGrp="1"/>
+          </p:cNvSpPr>
+          <p:nvPr>
+            <p:ph type="title"/>
+          </p:nvPr>
+        </p:nvSpPr>
+        <p:spPr/>
+        <p:txBody>
+          <a:bodyPr/>
+          <a:lstStyle/>
+          <a:p>
+            <a:r>
+              <a:rPr lang="en-US" dirty="0" smtClean="0"/>
+              <a:t>Design Form for Phone</a:t>
+            </a:r>
+            <a:endParaRPr lang="en-US" dirty="0"/>
+          </a:p>
+        </p:txBody>
+      </p:sp>
+      <p:sp>
+        <p:nvSpPr>
+          <p:cNvPr id="3" name="Content Placeholder 2"/>
+          <p:cNvSpPr>
+            <a:spLocks noGrp="1"/>
+          </p:cNvSpPr>
+          <p:nvPr>
+            <p:ph idx="1"/>
+          </p:nvPr>
+        </p:nvSpPr>
+        <p:spPr>
+          <a:xfrm>
+            <a:off x="838200" y="1825625"/>
+            <a:ext cx="10672482" cy="4351338"/>
+          </a:xfrm>
+        </p:spPr>
+        <p:txBody>
+          <a:bodyPr/>
+          <a:lstStyle/>
+          <a:p>
+            <a:r>
+              <a:rPr lang="en-US" dirty="0" smtClean="0"/>
+              <a:t>Display form elements on phone:</a:t>
+            </a:r>
+          </a:p>
+          <a:p>
+            <a:pPr lvl="1">
+              <a:buFont typeface="Courier New" panose="02070309020205020404" pitchFamily="49" charset="0"/>
+              <a:buChar char="o"/>
+            </a:pPr>
+            <a:r>
+              <a:rPr lang="en-US" dirty="0" smtClean="0"/>
+              <a:t>Step 1: Select field, section, entire tab.</a:t>
+            </a:r>
+          </a:p>
+          <a:p>
+            <a:pPr lvl="1">
+              <a:buFont typeface="Courier New" panose="02070309020205020404" pitchFamily="49" charset="0"/>
+              <a:buChar char="o"/>
+            </a:pPr>
+            <a:r>
+              <a:rPr lang="en-US" dirty="0" smtClean="0"/>
+              <a:t>Step 2: Change Properties =&gt; enable Available on phone.</a:t>
+            </a:r>
+          </a:p>
+          <a:p>
+            <a:r>
+              <a:rPr lang="en-US" dirty="0" smtClean="0"/>
+              <a:t>Add controls for a field: Display different controls for specific platform.</a:t>
+            </a:r>
+          </a:p>
+          <a:p>
+            <a:pPr lvl="1">
+              <a:buFont typeface="Courier New" panose="02070309020205020404" pitchFamily="49" charset="0"/>
+              <a:buChar char="o"/>
+            </a:pPr>
+            <a:r>
+              <a:rPr lang="en-US" dirty="0" smtClean="0"/>
+              <a:t>Step 1: Double click a field.</a:t>
+            </a:r>
+          </a:p>
+          <a:p>
+            <a:pPr lvl="1">
+              <a:buFont typeface="Courier New" panose="02070309020205020404" pitchFamily="49" charset="0"/>
+              <a:buChar char="o"/>
+            </a:pPr>
+            <a:r>
+              <a:rPr lang="en-US" dirty="0" smtClean="0"/>
+              <a:t>Step 2: Controls =&gt; Add Control.</a:t>
+            </a:r>
+            <a:endParaRPr lang="en-US" dirty="0"/>
+          </a:p>
+        </p:txBody>
+      </p:sp>
+    </p:spTree>
+    <p:extLst>
+      <p:ext uri="{BB962C8B-B14F-4D97-AF65-F5344CB8AC3E}">
+        <p14:creationId xmlns:p14="http://schemas.microsoft.com/office/powerpoint/2010/main" val="4221526332"/>
+      </p:ext>
+    </p:extLst>
+  </p:cSld>
+  <p:clrMapOvr>
+    <a:masterClrMapping/>
+  </p:clrMapOvr>
+</p:sld>
+</file>
+
+<file path=ppt/slides/slide18.xml><?xml version="1.0" encoding="utf-8"?>
+<p:sld xmlns:a="http://schemas.openxmlformats.org/drawingml/2006/main" xmlns:r="http://schemas.openxmlformats.org/officeDocument/2006/relationships" xmlns:p="http://schemas.openxmlformats.org/presentationml/2006/main">
+  <p:cSld>
+    <p:spTree>
+      <p:nvGrpSpPr>
+        <p:cNvPr id="1" name=""/>
+        <p:cNvGrpSpPr/>
+        <p:nvPr/>
+      </p:nvGrpSpPr>
+      <p:grpSpPr>
+        <a:xfrm>
+          <a:off x="0" y="0"/>
+          <a:ext cx="0" cy="0"/>
+          <a:chOff x="0" y="0"/>
+          <a:chExt cx="0" cy="0"/>
+        </a:xfrm>
+      </p:grpSpPr>
+      <p:sp>
+        <p:nvSpPr>
+          <p:cNvPr id="2" name="Title 1"/>
+          <p:cNvSpPr>
+            <a:spLocks noGrp="1"/>
+          </p:cNvSpPr>
+          <p:nvPr>
+            <p:ph type="title"/>
+          </p:nvPr>
+        </p:nvSpPr>
+        <p:spPr/>
+        <p:txBody>
+          <a:bodyPr/>
+          <a:lstStyle/>
+          <a:p>
+            <a:r>
+              <a:rPr lang="en-US" dirty="0" smtClean="0"/>
+              <a:t>Customizing Views</a:t>
+            </a:r>
+            <a:endParaRPr lang="en-US" dirty="0"/>
+          </a:p>
+        </p:txBody>
+      </p:sp>
+      <p:sp>
+        <p:nvSpPr>
+          <p:cNvPr id="3" name="Content Placeholder 2"/>
+          <p:cNvSpPr>
+            <a:spLocks noGrp="1"/>
+          </p:cNvSpPr>
+          <p:nvPr>
+            <p:ph idx="1"/>
+          </p:nvPr>
+        </p:nvSpPr>
+        <p:spPr/>
+        <p:txBody>
+          <a:bodyPr/>
+          <a:lstStyle/>
+          <a:p>
+            <a:r>
+              <a:rPr lang="en-US" dirty="0" smtClean="0"/>
+              <a:t>View characteristics.</a:t>
+            </a:r>
+          </a:p>
+          <a:p>
+            <a:r>
+              <a:rPr lang="en-US" dirty="0" smtClean="0"/>
+              <a:t>Types of view.</a:t>
+            </a:r>
+          </a:p>
+          <a:p>
+            <a:r>
+              <a:rPr lang="en-US" dirty="0" smtClean="0"/>
+              <a:t>Infinite loops.</a:t>
+            </a:r>
+          </a:p>
+          <a:p>
+            <a:r>
+              <a:rPr lang="en-US" dirty="0" smtClean="0"/>
+              <a:t>Monitor workflow status.</a:t>
+            </a:r>
+          </a:p>
+        </p:txBody>
+      </p:sp>
+    </p:spTree>
+    <p:extLst>
+      <p:ext uri="{BB962C8B-B14F-4D97-AF65-F5344CB8AC3E}">
+        <p14:creationId xmlns:p14="http://schemas.microsoft.com/office/powerpoint/2010/main" val="236472174"/>
+      </p:ext>
+    </p:extLst>
+  </p:cSld>
+  <p:clrMapOvr>
+    <a:masterClrMapping/>
+  </p:clrMapOvr>
+</p:sld>
+</file>
+
+<file path=ppt/slides/slide19.xml><?xml version="1.0" encoding="utf-8"?>
+<p:sld xmlns:a="http://schemas.openxmlformats.org/drawingml/2006/main" xmlns:r="http://schemas.openxmlformats.org/officeDocument/2006/relationships" xmlns:p="http://schemas.openxmlformats.org/presentationml/2006/main">
+  <p:cSld>
+    <p:spTree>
+      <p:nvGrpSpPr>
+        <p:cNvPr id="1" name=""/>
+        <p:cNvGrpSpPr/>
+        <p:nvPr/>
+      </p:nvGrpSpPr>
+      <p:grpSpPr>
+        <a:xfrm>
+          <a:off x="0" y="0"/>
+          <a:ext cx="0" cy="0"/>
+          <a:chOff x="0" y="0"/>
+          <a:chExt cx="0" cy="0"/>
+        </a:xfrm>
+      </p:grpSpPr>
+      <p:sp>
+        <p:nvSpPr>
+          <p:cNvPr id="2" name="Title 1"/>
+          <p:cNvSpPr>
+            <a:spLocks noGrp="1"/>
+          </p:cNvSpPr>
+          <p:nvPr>
+            <p:ph type="title"/>
+          </p:nvPr>
+        </p:nvSpPr>
+        <p:spPr/>
+        <p:txBody>
+          <a:bodyPr/>
+          <a:lstStyle/>
+          <a:p>
+            <a:r>
+              <a:rPr lang="en-US" dirty="0" smtClean="0"/>
+              <a:t>View Characteristics</a:t>
+            </a:r>
+            <a:endParaRPr lang="en-US" dirty="0"/>
+          </a:p>
+        </p:txBody>
+      </p:sp>
+      <p:sp>
+        <p:nvSpPr>
+          <p:cNvPr id="3" name="Content Placeholder 2"/>
+          <p:cNvSpPr>
+            <a:spLocks noGrp="1"/>
+          </p:cNvSpPr>
+          <p:nvPr>
+            <p:ph idx="1"/>
+          </p:nvPr>
+        </p:nvSpPr>
+        <p:spPr/>
+        <p:txBody>
+          <a:bodyPr/>
+          <a:lstStyle/>
+          <a:p>
+            <a:r>
+              <a:rPr lang="en-US" dirty="0" smtClean="0"/>
+              <a:t>Defines how a list of records for a specific entity is displayed.</a:t>
+            </a:r>
+          </a:p>
+          <a:p>
+            <a:r>
+              <a:rPr lang="en-US" dirty="0" smtClean="0"/>
+              <a:t>To create a view, user must answer questions:</a:t>
+            </a:r>
+          </a:p>
+          <a:p>
+            <a:pPr lvl="1">
+              <a:buFont typeface="Courier New" panose="02070309020205020404" pitchFamily="49" charset="0"/>
+              <a:buChar char="o"/>
+            </a:pPr>
+            <a:r>
+              <a:rPr lang="en-US" dirty="0" smtClean="0"/>
+              <a:t>What columns to display?</a:t>
+            </a:r>
+          </a:p>
+          <a:p>
+            <a:pPr lvl="1">
+              <a:buFont typeface="Courier New" panose="02070309020205020404" pitchFamily="49" charset="0"/>
+              <a:buChar char="o"/>
+            </a:pPr>
+            <a:r>
+              <a:rPr lang="en-US" dirty="0" smtClean="0"/>
+              <a:t>How wide for each column?</a:t>
+            </a:r>
+          </a:p>
+          <a:p>
+            <a:pPr lvl="1">
+              <a:buFont typeface="Courier New" panose="02070309020205020404" pitchFamily="49" charset="0"/>
+              <a:buChar char="o"/>
+            </a:pPr>
+            <a:r>
+              <a:rPr lang="en-US" dirty="0" smtClean="0"/>
+              <a:t>How it is sorted by default?</a:t>
+            </a:r>
+          </a:p>
+          <a:p>
+            <a:pPr lvl="1">
+              <a:buFont typeface="Courier New" panose="02070309020205020404" pitchFamily="49" charset="0"/>
+              <a:buChar char="o"/>
+            </a:pPr>
+            <a:r>
+              <a:rPr lang="en-US" dirty="0" smtClean="0"/>
+              <a:t>Which is the default filter?</a:t>
+            </a:r>
+          </a:p>
+          <a:p>
+            <a:pPr algn="just"/>
+            <a:r>
+              <a:rPr lang="en-US" dirty="0" smtClean="0"/>
+              <a:t>User with role System Administrator or System Customizer can use Editable Grid or Read Only Grid to create view.</a:t>
+            </a:r>
+            <a:endParaRPr lang="en-US" dirty="0"/>
+          </a:p>
+        </p:txBody>
+      </p:sp>
+    </p:spTree>
+    <p:extLst>
+      <p:ext uri="{BB962C8B-B14F-4D97-AF65-F5344CB8AC3E}">
+        <p14:creationId xmlns:p14="http://schemas.microsoft.com/office/powerpoint/2010/main" val="3521967176"/>
       </p:ext>
     </p:extLst>
   </p:cSld>
@@ -3065,6 +4131,1394 @@
           <a:lstStyle/>
           <a:p>
             <a:r>
+              <a:rPr lang="en-US" dirty="0"/>
+              <a:t>Customization in Dynamics </a:t>
+            </a:r>
+            <a:r>
+              <a:rPr lang="en-US" dirty="0" smtClean="0"/>
+              <a:t>365</a:t>
+            </a:r>
+            <a:endParaRPr lang="en-US" dirty="0"/>
+          </a:p>
+        </p:txBody>
+      </p:sp>
+      <p:sp>
+        <p:nvSpPr>
+          <p:cNvPr id="3" name="Content Placeholder 2"/>
+          <p:cNvSpPr>
+            <a:spLocks noGrp="1"/>
+          </p:cNvSpPr>
+          <p:nvPr>
+            <p:ph idx="1"/>
+          </p:nvPr>
+        </p:nvSpPr>
+        <p:spPr/>
+        <p:txBody>
+          <a:bodyPr/>
+          <a:lstStyle/>
+          <a:p>
+            <a:r>
+              <a:rPr lang="en-US" dirty="0" smtClean="0"/>
+              <a:t>Customize fields.</a:t>
+            </a:r>
+          </a:p>
+          <a:p>
+            <a:r>
+              <a:rPr lang="en-US" dirty="0" smtClean="0"/>
+              <a:t>Customize entities.</a:t>
+            </a:r>
+          </a:p>
+          <a:p>
+            <a:r>
+              <a:rPr lang="en-US" dirty="0" smtClean="0"/>
+              <a:t>Customize form.</a:t>
+            </a:r>
+          </a:p>
+          <a:p>
+            <a:r>
+              <a:rPr lang="en-US" dirty="0" smtClean="0"/>
+              <a:t>Customize view.</a:t>
+            </a:r>
+          </a:p>
+          <a:p>
+            <a:r>
+              <a:rPr lang="en-US" dirty="0" smtClean="0"/>
+              <a:t>Customize chart &amp; dashboard.</a:t>
+            </a:r>
+            <a:endParaRPr lang="en-US" dirty="0"/>
+          </a:p>
+        </p:txBody>
+      </p:sp>
+    </p:spTree>
+    <p:extLst>
+      <p:ext uri="{BB962C8B-B14F-4D97-AF65-F5344CB8AC3E}">
+        <p14:creationId xmlns:p14="http://schemas.microsoft.com/office/powerpoint/2010/main" val="1461780225"/>
+      </p:ext>
+    </p:extLst>
+  </p:cSld>
+  <p:clrMapOvr>
+    <a:masterClrMapping/>
+  </p:clrMapOvr>
+</p:sld>
+</file>
+
+<file path=ppt/slides/slide20.xml><?xml version="1.0" encoding="utf-8"?>
+<p:sld xmlns:a="http://schemas.openxmlformats.org/drawingml/2006/main" xmlns:r="http://schemas.openxmlformats.org/officeDocument/2006/relationships" xmlns:p="http://schemas.openxmlformats.org/presentationml/2006/main">
+  <p:cSld>
+    <p:spTree>
+      <p:nvGrpSpPr>
+        <p:cNvPr id="1" name=""/>
+        <p:cNvGrpSpPr/>
+        <p:nvPr/>
+      </p:nvGrpSpPr>
+      <p:grpSpPr>
+        <a:xfrm>
+          <a:off x="0" y="0"/>
+          <a:ext cx="0" cy="0"/>
+          <a:chOff x="0" y="0"/>
+          <a:chExt cx="0" cy="0"/>
+        </a:xfrm>
+      </p:grpSpPr>
+      <p:sp>
+        <p:nvSpPr>
+          <p:cNvPr id="2" name="Title 1"/>
+          <p:cNvSpPr>
+            <a:spLocks noGrp="1"/>
+          </p:cNvSpPr>
+          <p:nvPr>
+            <p:ph type="title"/>
+          </p:nvPr>
+        </p:nvSpPr>
+        <p:spPr/>
+        <p:txBody>
+          <a:bodyPr/>
+          <a:lstStyle/>
+          <a:p>
+            <a:r>
+              <a:rPr lang="en-US" dirty="0" smtClean="0"/>
+              <a:t>Types of View</a:t>
+            </a:r>
+            <a:endParaRPr lang="en-US" dirty="0"/>
+          </a:p>
+        </p:txBody>
+      </p:sp>
+      <p:sp>
+        <p:nvSpPr>
+          <p:cNvPr id="3" name="Content Placeholder 2"/>
+          <p:cNvSpPr>
+            <a:spLocks noGrp="1"/>
+          </p:cNvSpPr>
+          <p:nvPr>
+            <p:ph idx="1"/>
+          </p:nvPr>
+        </p:nvSpPr>
+        <p:spPr/>
+        <p:txBody>
+          <a:bodyPr/>
+          <a:lstStyle/>
+          <a:p>
+            <a:r>
+              <a:rPr lang="en-US" dirty="0" smtClean="0"/>
+              <a:t>Personal views: Users create their own views by Advance Find or Save Filter function and save them.</a:t>
+            </a:r>
+          </a:p>
+          <a:p>
+            <a:r>
+              <a:rPr lang="en-US" dirty="0" smtClean="0"/>
+              <a:t>Public views: Everyone can access it, used for general purpose.</a:t>
+            </a:r>
+          </a:p>
+          <a:p>
+            <a:r>
+              <a:rPr lang="en-US" dirty="0" smtClean="0"/>
+              <a:t>System views: Similar to public views but created automatically by CRM, used for unique situations.</a:t>
+            </a:r>
+          </a:p>
+          <a:p>
+            <a:pPr marL="0" indent="0">
+              <a:buNone/>
+            </a:pPr>
+            <a:endParaRPr lang="en-US" dirty="0" smtClean="0"/>
+          </a:p>
+        </p:txBody>
+      </p:sp>
+    </p:spTree>
+    <p:extLst>
+      <p:ext uri="{BB962C8B-B14F-4D97-AF65-F5344CB8AC3E}">
+        <p14:creationId xmlns:p14="http://schemas.microsoft.com/office/powerpoint/2010/main" val="99870764"/>
+      </p:ext>
+    </p:extLst>
+  </p:cSld>
+  <p:clrMapOvr>
+    <a:masterClrMapping/>
+  </p:clrMapOvr>
+</p:sld>
+</file>
+
+<file path=ppt/slides/slide21.xml><?xml version="1.0" encoding="utf-8"?>
+<p:sld xmlns:a="http://schemas.openxmlformats.org/drawingml/2006/main" xmlns:r="http://schemas.openxmlformats.org/officeDocument/2006/relationships" xmlns:p="http://schemas.openxmlformats.org/presentationml/2006/main">
+  <p:cSld>
+    <p:spTree>
+      <p:nvGrpSpPr>
+        <p:cNvPr id="1" name=""/>
+        <p:cNvGrpSpPr/>
+        <p:nvPr/>
+      </p:nvGrpSpPr>
+      <p:grpSpPr>
+        <a:xfrm>
+          <a:off x="0" y="0"/>
+          <a:ext cx="0" cy="0"/>
+          <a:chOff x="0" y="0"/>
+          <a:chExt cx="0" cy="0"/>
+        </a:xfrm>
+      </p:grpSpPr>
+      <p:sp>
+        <p:nvSpPr>
+          <p:cNvPr id="2" name="Title 1"/>
+          <p:cNvSpPr>
+            <a:spLocks noGrp="1"/>
+          </p:cNvSpPr>
+          <p:nvPr>
+            <p:ph type="title"/>
+          </p:nvPr>
+        </p:nvSpPr>
+        <p:spPr/>
+        <p:txBody>
+          <a:bodyPr/>
+          <a:lstStyle/>
+          <a:p>
+            <a:r>
+              <a:rPr lang="en-US" dirty="0" smtClean="0"/>
+              <a:t>Customizing Workflows</a:t>
+            </a:r>
+            <a:endParaRPr lang="en-US" dirty="0"/>
+          </a:p>
+        </p:txBody>
+      </p:sp>
+      <p:sp>
+        <p:nvSpPr>
+          <p:cNvPr id="3" name="Content Placeholder 2"/>
+          <p:cNvSpPr>
+            <a:spLocks noGrp="1"/>
+          </p:cNvSpPr>
+          <p:nvPr>
+            <p:ph idx="1"/>
+          </p:nvPr>
+        </p:nvSpPr>
+        <p:spPr/>
+        <p:txBody>
+          <a:bodyPr/>
+          <a:lstStyle/>
+          <a:p>
+            <a:r>
+              <a:rPr lang="en-US" dirty="0" smtClean="0"/>
+              <a:t>Workflow characteristics.</a:t>
+            </a:r>
+          </a:p>
+          <a:p>
+            <a:r>
+              <a:rPr lang="en-US" dirty="0" smtClean="0"/>
+              <a:t>Types of workflow.</a:t>
+            </a:r>
+          </a:p>
+          <a:p>
+            <a:r>
+              <a:rPr lang="en-US" dirty="0" smtClean="0"/>
+              <a:t>Key options.</a:t>
+            </a:r>
+          </a:p>
+          <a:p>
+            <a:r>
+              <a:rPr lang="en-US" dirty="0" smtClean="0"/>
+              <a:t>Infinite loops.</a:t>
+            </a:r>
+          </a:p>
+          <a:p>
+            <a:r>
+              <a:rPr lang="en-US" dirty="0" smtClean="0"/>
+              <a:t>Monitoring workflow status.</a:t>
+            </a:r>
+          </a:p>
+          <a:p>
+            <a:r>
+              <a:rPr lang="en-US" dirty="0" smtClean="0"/>
+              <a:t>Life cycle:</a:t>
+            </a:r>
+            <a:endParaRPr lang="en-US" dirty="0"/>
+          </a:p>
+        </p:txBody>
+      </p:sp>
+      <p:grpSp>
+        <p:nvGrpSpPr>
+          <p:cNvPr id="4" name="Group 3"/>
+          <p:cNvGrpSpPr/>
+          <p:nvPr/>
+        </p:nvGrpSpPr>
+        <p:grpSpPr>
+          <a:xfrm>
+            <a:off x="3646867" y="4725650"/>
+            <a:ext cx="4898266" cy="1586250"/>
+            <a:chOff x="2917575" y="4725650"/>
+            <a:chExt cx="4898266" cy="1586250"/>
+          </a:xfrm>
+        </p:grpSpPr>
+        <p:sp>
+          <p:nvSpPr>
+            <p:cNvPr id="5" name="Oval 4"/>
+            <p:cNvSpPr/>
+            <p:nvPr/>
+          </p:nvSpPr>
+          <p:spPr>
+            <a:xfrm>
+              <a:off x="6229592" y="4725651"/>
+              <a:ext cx="1586249" cy="1586249"/>
+            </a:xfrm>
+            <a:prstGeom prst="ellipse">
+              <a:avLst/>
+            </a:prstGeom>
+          </p:spPr>
+          <p:style>
+            <a:lnRef idx="2">
+              <a:schemeClr val="accent1">
+                <a:shade val="50000"/>
+              </a:schemeClr>
+            </a:lnRef>
+            <a:fillRef idx="1">
+              <a:schemeClr val="accent1"/>
+            </a:fillRef>
+            <a:effectRef idx="0">
+              <a:schemeClr val="accent1"/>
+            </a:effectRef>
+            <a:fontRef idx="minor">
+              <a:schemeClr val="lt1"/>
+            </a:fontRef>
+          </p:style>
+          <p:txBody>
+            <a:bodyPr rtlCol="0" anchor="ctr"/>
+            <a:lstStyle/>
+            <a:p>
+              <a:pPr algn="ctr"/>
+              <a:r>
+                <a:rPr lang="en-US" sz="1500" dirty="0" smtClean="0"/>
+                <a:t>Active</a:t>
+              </a:r>
+            </a:p>
+          </p:txBody>
+        </p:sp>
+        <p:sp>
+          <p:nvSpPr>
+            <p:cNvPr id="6" name="Oval 5"/>
+            <p:cNvSpPr/>
+            <p:nvPr/>
+          </p:nvSpPr>
+          <p:spPr>
+            <a:xfrm>
+              <a:off x="2917575" y="4725650"/>
+              <a:ext cx="1586249" cy="1586249"/>
+            </a:xfrm>
+            <a:prstGeom prst="ellipse">
+              <a:avLst/>
+            </a:prstGeom>
+          </p:spPr>
+          <p:style>
+            <a:lnRef idx="2">
+              <a:schemeClr val="accent1">
+                <a:shade val="50000"/>
+              </a:schemeClr>
+            </a:lnRef>
+            <a:fillRef idx="1">
+              <a:schemeClr val="accent1"/>
+            </a:fillRef>
+            <a:effectRef idx="0">
+              <a:schemeClr val="accent1"/>
+            </a:effectRef>
+            <a:fontRef idx="minor">
+              <a:schemeClr val="lt1"/>
+            </a:fontRef>
+          </p:style>
+          <p:txBody>
+            <a:bodyPr rtlCol="0" anchor="ctr"/>
+            <a:lstStyle/>
+            <a:p>
+              <a:pPr algn="ctr"/>
+              <a:r>
+                <a:rPr lang="en-US" sz="1500" dirty="0" smtClean="0"/>
+                <a:t>Draft</a:t>
+              </a:r>
+              <a:endParaRPr lang="en-US" sz="1500" dirty="0"/>
+            </a:p>
+          </p:txBody>
+        </p:sp>
+        <p:cxnSp>
+          <p:nvCxnSpPr>
+            <p:cNvPr id="7" name="Straight Arrow Connector 6"/>
+            <p:cNvCxnSpPr>
+              <a:stCxn id="6" idx="6"/>
+              <a:endCxn id="5" idx="2"/>
+            </p:cNvCxnSpPr>
+            <p:nvPr/>
+          </p:nvCxnSpPr>
+          <p:spPr>
+            <a:xfrm>
+              <a:off x="4503824" y="5518775"/>
+              <a:ext cx="1725768" cy="1"/>
+            </a:xfrm>
+            <a:prstGeom prst="straightConnector1">
+              <a:avLst/>
+            </a:prstGeom>
+            <a:ln>
+              <a:tailEnd type="triangle"/>
+            </a:ln>
+          </p:spPr>
+          <p:style>
+            <a:lnRef idx="1">
+              <a:schemeClr val="accent1"/>
+            </a:lnRef>
+            <a:fillRef idx="0">
+              <a:schemeClr val="accent1"/>
+            </a:fillRef>
+            <a:effectRef idx="0">
+              <a:schemeClr val="accent1"/>
+            </a:effectRef>
+            <a:fontRef idx="minor">
+              <a:schemeClr val="tx1"/>
+            </a:fontRef>
+          </p:style>
+        </p:cxnSp>
+        <p:sp>
+          <p:nvSpPr>
+            <p:cNvPr id="8" name="TextBox 7"/>
+            <p:cNvSpPr txBox="1"/>
+            <p:nvPr/>
+          </p:nvSpPr>
+          <p:spPr>
+            <a:xfrm>
+              <a:off x="4503288" y="5206836"/>
+              <a:ext cx="1521853" cy="369332"/>
+            </a:xfrm>
+            <a:prstGeom prst="rect">
+              <a:avLst/>
+            </a:prstGeom>
+            <a:noFill/>
+          </p:spPr>
+          <p:txBody>
+            <a:bodyPr wrap="square" rtlCol="0">
+              <a:spAutoFit/>
+            </a:bodyPr>
+            <a:lstStyle/>
+            <a:p>
+              <a:pPr algn="ctr"/>
+              <a:r>
+                <a:rPr lang="en-US" dirty="0" smtClean="0"/>
+                <a:t>Activate</a:t>
+              </a:r>
+              <a:endParaRPr lang="en-US" dirty="0"/>
+            </a:p>
+          </p:txBody>
+        </p:sp>
+        <p:cxnSp>
+          <p:nvCxnSpPr>
+            <p:cNvPr id="9" name="Straight Arrow Connector 8"/>
+            <p:cNvCxnSpPr/>
+            <p:nvPr/>
+          </p:nvCxnSpPr>
+          <p:spPr>
+            <a:xfrm flipH="1" flipV="1">
+              <a:off x="4503288" y="5686344"/>
+              <a:ext cx="1738030" cy="14514"/>
+            </a:xfrm>
+            <a:prstGeom prst="straightConnector1">
+              <a:avLst/>
+            </a:prstGeom>
+            <a:ln>
+              <a:tailEnd type="triangle"/>
+            </a:ln>
+          </p:spPr>
+          <p:style>
+            <a:lnRef idx="1">
+              <a:schemeClr val="accent1"/>
+            </a:lnRef>
+            <a:fillRef idx="0">
+              <a:schemeClr val="accent1"/>
+            </a:fillRef>
+            <a:effectRef idx="0">
+              <a:schemeClr val="accent1"/>
+            </a:effectRef>
+            <a:fontRef idx="minor">
+              <a:schemeClr val="tx1"/>
+            </a:fontRef>
+          </p:style>
+        </p:cxnSp>
+        <p:sp>
+          <p:nvSpPr>
+            <p:cNvPr id="10" name="TextBox 9"/>
+            <p:cNvSpPr txBox="1"/>
+            <p:nvPr/>
+          </p:nvSpPr>
+          <p:spPr>
+            <a:xfrm>
+              <a:off x="4483088" y="5674220"/>
+              <a:ext cx="1521853" cy="369332"/>
+            </a:xfrm>
+            <a:prstGeom prst="rect">
+              <a:avLst/>
+            </a:prstGeom>
+            <a:noFill/>
+          </p:spPr>
+          <p:txBody>
+            <a:bodyPr wrap="square" rtlCol="0">
+              <a:spAutoFit/>
+            </a:bodyPr>
+            <a:lstStyle/>
+            <a:p>
+              <a:pPr algn="ctr"/>
+              <a:r>
+                <a:rPr lang="en-US" dirty="0" smtClean="0"/>
+                <a:t>Deactivate</a:t>
+              </a:r>
+              <a:endParaRPr lang="en-US" dirty="0"/>
+            </a:p>
+          </p:txBody>
+        </p:sp>
+      </p:grpSp>
+    </p:spTree>
+    <p:extLst>
+      <p:ext uri="{BB962C8B-B14F-4D97-AF65-F5344CB8AC3E}">
+        <p14:creationId xmlns:p14="http://schemas.microsoft.com/office/powerpoint/2010/main" val="3282680245"/>
+      </p:ext>
+    </p:extLst>
+  </p:cSld>
+  <p:clrMapOvr>
+    <a:masterClrMapping/>
+  </p:clrMapOvr>
+</p:sld>
+</file>
+
+<file path=ppt/slides/slide22.xml><?xml version="1.0" encoding="utf-8"?>
+<p:sld xmlns:a="http://schemas.openxmlformats.org/drawingml/2006/main" xmlns:r="http://schemas.openxmlformats.org/officeDocument/2006/relationships" xmlns:p="http://schemas.openxmlformats.org/presentationml/2006/main">
+  <p:cSld>
+    <p:spTree>
+      <p:nvGrpSpPr>
+        <p:cNvPr id="1" name=""/>
+        <p:cNvGrpSpPr/>
+        <p:nvPr/>
+      </p:nvGrpSpPr>
+      <p:grpSpPr>
+        <a:xfrm>
+          <a:off x="0" y="0"/>
+          <a:ext cx="0" cy="0"/>
+          <a:chOff x="0" y="0"/>
+          <a:chExt cx="0" cy="0"/>
+        </a:xfrm>
+      </p:grpSpPr>
+      <p:sp>
+        <p:nvSpPr>
+          <p:cNvPr id="2" name="Title 1"/>
+          <p:cNvSpPr>
+            <a:spLocks noGrp="1"/>
+          </p:cNvSpPr>
+          <p:nvPr>
+            <p:ph type="title"/>
+          </p:nvPr>
+        </p:nvSpPr>
+        <p:spPr/>
+        <p:txBody>
+          <a:bodyPr/>
+          <a:lstStyle/>
+          <a:p>
+            <a:r>
+              <a:rPr lang="en-US" dirty="0" smtClean="0"/>
+              <a:t>Workflow Characteristic</a:t>
+            </a:r>
+            <a:endParaRPr lang="en-US" dirty="0"/>
+          </a:p>
+        </p:txBody>
+      </p:sp>
+      <p:sp>
+        <p:nvSpPr>
+          <p:cNvPr id="3" name="Content Placeholder 2"/>
+          <p:cNvSpPr>
+            <a:spLocks noGrp="1"/>
+          </p:cNvSpPr>
+          <p:nvPr>
+            <p:ph idx="1"/>
+          </p:nvPr>
+        </p:nvSpPr>
+        <p:spPr/>
+        <p:txBody>
+          <a:bodyPr/>
+          <a:lstStyle/>
+          <a:p>
+            <a:r>
+              <a:rPr lang="en-US" dirty="0" smtClean="0"/>
+              <a:t>Automate business process.</a:t>
+            </a:r>
+          </a:p>
+          <a:p>
+            <a:r>
+              <a:rPr lang="en-US" dirty="0" smtClean="0"/>
+              <a:t>No UI.</a:t>
+            </a:r>
+          </a:p>
+          <a:p>
+            <a:r>
+              <a:rPr lang="en-US" dirty="0" smtClean="0"/>
+              <a:t>Not require users to interact.</a:t>
+            </a:r>
+          </a:p>
+          <a:p>
+            <a:r>
+              <a:rPr lang="en-US" dirty="0" smtClean="0"/>
+              <a:t>Each workflow associate with a single entity.</a:t>
+            </a:r>
+          </a:p>
+          <a:p>
+            <a:r>
+              <a:rPr lang="en-US" dirty="0" smtClean="0"/>
+              <a:t>Can switch to background/real-time workflow anytime.</a:t>
+            </a:r>
+          </a:p>
+        </p:txBody>
+      </p:sp>
+    </p:spTree>
+    <p:extLst>
+      <p:ext uri="{BB962C8B-B14F-4D97-AF65-F5344CB8AC3E}">
+        <p14:creationId xmlns:p14="http://schemas.microsoft.com/office/powerpoint/2010/main" val="3193752068"/>
+      </p:ext>
+    </p:extLst>
+  </p:cSld>
+  <p:clrMapOvr>
+    <a:masterClrMapping/>
+  </p:clrMapOvr>
+</p:sld>
+</file>
+
+<file path=ppt/slides/slide23.xml><?xml version="1.0" encoding="utf-8"?>
+<p:sld xmlns:a="http://schemas.openxmlformats.org/drawingml/2006/main" xmlns:r="http://schemas.openxmlformats.org/officeDocument/2006/relationships" xmlns:p="http://schemas.openxmlformats.org/presentationml/2006/main">
+  <p:cSld>
+    <p:spTree>
+      <p:nvGrpSpPr>
+        <p:cNvPr id="1" name=""/>
+        <p:cNvGrpSpPr/>
+        <p:nvPr/>
+      </p:nvGrpSpPr>
+      <p:grpSpPr>
+        <a:xfrm>
+          <a:off x="0" y="0"/>
+          <a:ext cx="0" cy="0"/>
+          <a:chOff x="0" y="0"/>
+          <a:chExt cx="0" cy="0"/>
+        </a:xfrm>
+      </p:grpSpPr>
+      <p:sp>
+        <p:nvSpPr>
+          <p:cNvPr id="2" name="Title 1"/>
+          <p:cNvSpPr>
+            <a:spLocks noGrp="1"/>
+          </p:cNvSpPr>
+          <p:nvPr>
+            <p:ph type="title"/>
+          </p:nvPr>
+        </p:nvSpPr>
+        <p:spPr/>
+        <p:txBody>
+          <a:bodyPr/>
+          <a:lstStyle/>
+          <a:p>
+            <a:r>
+              <a:rPr lang="en-US" dirty="0" smtClean="0"/>
+              <a:t>Types of Workflow</a:t>
+            </a:r>
+            <a:endParaRPr lang="en-US" dirty="0"/>
+          </a:p>
+        </p:txBody>
+      </p:sp>
+      <p:sp>
+        <p:nvSpPr>
+          <p:cNvPr id="3" name="Content Placeholder 2"/>
+          <p:cNvSpPr>
+            <a:spLocks noGrp="1"/>
+          </p:cNvSpPr>
+          <p:nvPr>
+            <p:ph idx="1"/>
+          </p:nvPr>
+        </p:nvSpPr>
+        <p:spPr/>
+        <p:txBody>
+          <a:bodyPr/>
+          <a:lstStyle/>
+          <a:p>
+            <a:r>
+              <a:rPr lang="en-US" dirty="0" smtClean="0"/>
+              <a:t>Background workflow (asynchronous).</a:t>
+            </a:r>
+          </a:p>
+          <a:p>
+            <a:r>
+              <a:rPr lang="en-US" dirty="0" smtClean="0"/>
+              <a:t>Real-time workflow (synchronous).</a:t>
+            </a:r>
+            <a:endParaRPr lang="en-US" dirty="0"/>
+          </a:p>
+        </p:txBody>
+      </p:sp>
+    </p:spTree>
+    <p:extLst>
+      <p:ext uri="{BB962C8B-B14F-4D97-AF65-F5344CB8AC3E}">
+        <p14:creationId xmlns:p14="http://schemas.microsoft.com/office/powerpoint/2010/main" val="825637364"/>
+      </p:ext>
+    </p:extLst>
+  </p:cSld>
+  <p:clrMapOvr>
+    <a:masterClrMapping/>
+  </p:clrMapOvr>
+</p:sld>
+</file>
+
+<file path=ppt/slides/slide24.xml><?xml version="1.0" encoding="utf-8"?>
+<p:sld xmlns:a="http://schemas.openxmlformats.org/drawingml/2006/main" xmlns:r="http://schemas.openxmlformats.org/officeDocument/2006/relationships" xmlns:p="http://schemas.openxmlformats.org/presentationml/2006/main">
+  <p:cSld>
+    <p:spTree>
+      <p:nvGrpSpPr>
+        <p:cNvPr id="1" name=""/>
+        <p:cNvGrpSpPr/>
+        <p:nvPr/>
+      </p:nvGrpSpPr>
+      <p:grpSpPr>
+        <a:xfrm>
+          <a:off x="0" y="0"/>
+          <a:ext cx="0" cy="0"/>
+          <a:chOff x="0" y="0"/>
+          <a:chExt cx="0" cy="0"/>
+        </a:xfrm>
+      </p:grpSpPr>
+      <p:sp>
+        <p:nvSpPr>
+          <p:cNvPr id="2" name="Title 1"/>
+          <p:cNvSpPr>
+            <a:spLocks noGrp="1"/>
+          </p:cNvSpPr>
+          <p:nvPr>
+            <p:ph type="title"/>
+          </p:nvPr>
+        </p:nvSpPr>
+        <p:spPr/>
+        <p:txBody>
+          <a:bodyPr/>
+          <a:lstStyle/>
+          <a:p>
+            <a:r>
+              <a:rPr lang="en-US" dirty="0" smtClean="0"/>
+              <a:t>Key Options</a:t>
+            </a:r>
+            <a:endParaRPr lang="en-US" dirty="0"/>
+          </a:p>
+        </p:txBody>
+      </p:sp>
+      <p:sp>
+        <p:nvSpPr>
+          <p:cNvPr id="3" name="Content Placeholder 2"/>
+          <p:cNvSpPr>
+            <a:spLocks noGrp="1"/>
+          </p:cNvSpPr>
+          <p:nvPr>
+            <p:ph idx="1"/>
+          </p:nvPr>
+        </p:nvSpPr>
+        <p:spPr/>
+        <p:txBody>
+          <a:bodyPr/>
+          <a:lstStyle/>
+          <a:p>
+            <a:r>
+              <a:rPr lang="en-US" dirty="0" smtClean="0"/>
+              <a:t>Scope: workflow will run on which records.</a:t>
+            </a:r>
+          </a:p>
+          <a:p>
+            <a:r>
+              <a:rPr lang="en-US" dirty="0" smtClean="0"/>
+              <a:t>Start when: record is created/status changed/ assigned/deleted/fields change.</a:t>
+            </a:r>
+          </a:p>
+          <a:p>
+            <a:r>
+              <a:rPr lang="en-US" dirty="0" smtClean="0"/>
+              <a:t>Workflow step: what exactly workflow will perform.</a:t>
+            </a:r>
+          </a:p>
+          <a:p>
+            <a:pPr lvl="1">
+              <a:buFont typeface="Courier New" panose="02070309020205020404" pitchFamily="49" charset="0"/>
+              <a:buChar char="o"/>
+            </a:pPr>
+            <a:r>
+              <a:rPr lang="en-US" dirty="0" smtClean="0"/>
+              <a:t>Stage: split workflow into sections.</a:t>
+            </a:r>
+          </a:p>
+          <a:p>
+            <a:pPr lvl="1">
+              <a:buFont typeface="Courier New" panose="02070309020205020404" pitchFamily="49" charset="0"/>
+              <a:buChar char="o"/>
+            </a:pPr>
+            <a:r>
+              <a:rPr lang="en-US" dirty="0" smtClean="0"/>
+              <a:t>Check Condition: add if __ then __ statement.</a:t>
+            </a:r>
+          </a:p>
+          <a:p>
+            <a:pPr lvl="1">
+              <a:buFont typeface="Courier New" panose="02070309020205020404" pitchFamily="49" charset="0"/>
+              <a:buChar char="o"/>
+            </a:pPr>
+            <a:r>
+              <a:rPr lang="en-US" dirty="0" smtClean="0"/>
+              <a:t>Conditional Branch: must follow Check Condition. Add else __ if __ then __.</a:t>
+            </a:r>
+          </a:p>
+          <a:p>
+            <a:pPr lvl="1">
+              <a:buFont typeface="Courier New" panose="02070309020205020404" pitchFamily="49" charset="0"/>
+              <a:buChar char="o"/>
+            </a:pPr>
+            <a:r>
+              <a:rPr lang="en-US" dirty="0" smtClean="0"/>
+              <a:t>Default Action: must follow Check Condition. Add else __</a:t>
+            </a:r>
+          </a:p>
+          <a:p>
+            <a:pPr lvl="1">
+              <a:buFont typeface="Courier New" panose="02070309020205020404" pitchFamily="49" charset="0"/>
+              <a:buChar char="o"/>
+            </a:pPr>
+            <a:r>
+              <a:rPr lang="en-US" dirty="0" smtClean="0"/>
+              <a:t>Wait Condition: real-time workflow cannot use this. Pause the workflow until the condition has been met.</a:t>
+            </a:r>
+          </a:p>
+        </p:txBody>
+      </p:sp>
+    </p:spTree>
+    <p:extLst>
+      <p:ext uri="{BB962C8B-B14F-4D97-AF65-F5344CB8AC3E}">
+        <p14:creationId xmlns:p14="http://schemas.microsoft.com/office/powerpoint/2010/main" val="884658469"/>
+      </p:ext>
+    </p:extLst>
+  </p:cSld>
+  <p:clrMapOvr>
+    <a:masterClrMapping/>
+  </p:clrMapOvr>
+</p:sld>
+</file>
+
+<file path=ppt/slides/slide25.xml><?xml version="1.0" encoding="utf-8"?>
+<p:sld xmlns:a="http://schemas.openxmlformats.org/drawingml/2006/main" xmlns:r="http://schemas.openxmlformats.org/officeDocument/2006/relationships" xmlns:p="http://schemas.openxmlformats.org/presentationml/2006/main">
+  <p:cSld>
+    <p:spTree>
+      <p:nvGrpSpPr>
+        <p:cNvPr id="1" name=""/>
+        <p:cNvGrpSpPr/>
+        <p:nvPr/>
+      </p:nvGrpSpPr>
+      <p:grpSpPr>
+        <a:xfrm>
+          <a:off x="0" y="0"/>
+          <a:ext cx="0" cy="0"/>
+          <a:chOff x="0" y="0"/>
+          <a:chExt cx="0" cy="0"/>
+        </a:xfrm>
+      </p:grpSpPr>
+      <p:sp>
+        <p:nvSpPr>
+          <p:cNvPr id="2" name="Title 1"/>
+          <p:cNvSpPr>
+            <a:spLocks noGrp="1"/>
+          </p:cNvSpPr>
+          <p:nvPr>
+            <p:ph type="title"/>
+          </p:nvPr>
+        </p:nvSpPr>
+        <p:spPr/>
+        <p:txBody>
+          <a:bodyPr/>
+          <a:lstStyle/>
+          <a:p>
+            <a:r>
+              <a:rPr lang="en-US" dirty="0" smtClean="0"/>
+              <a:t>Key Options</a:t>
+            </a:r>
+            <a:endParaRPr lang="en-US" dirty="0"/>
+          </a:p>
+        </p:txBody>
+      </p:sp>
+      <p:sp>
+        <p:nvSpPr>
+          <p:cNvPr id="3" name="Content Placeholder 2"/>
+          <p:cNvSpPr>
+            <a:spLocks noGrp="1"/>
+          </p:cNvSpPr>
+          <p:nvPr>
+            <p:ph idx="1"/>
+          </p:nvPr>
+        </p:nvSpPr>
+        <p:spPr/>
+        <p:txBody>
+          <a:bodyPr/>
+          <a:lstStyle/>
+          <a:p>
+            <a:r>
+              <a:rPr lang="en-US" dirty="0" smtClean="0"/>
+              <a:t>Workflow step: (continue)</a:t>
+            </a:r>
+          </a:p>
+          <a:p>
+            <a:pPr lvl="1">
+              <a:buFont typeface="Courier New" panose="02070309020205020404" pitchFamily="49" charset="0"/>
+              <a:buChar char="o"/>
+            </a:pPr>
+            <a:r>
+              <a:rPr lang="en-US" dirty="0" smtClean="0"/>
+              <a:t>Parallel Wait Branch: same as Wait Condition but runs parallel to the workflow.</a:t>
+            </a:r>
+          </a:p>
+          <a:p>
+            <a:pPr lvl="1">
+              <a:buFont typeface="Courier New" panose="02070309020205020404" pitchFamily="49" charset="0"/>
+              <a:buChar char="o"/>
+            </a:pPr>
+            <a:r>
+              <a:rPr lang="en-US" dirty="0" smtClean="0"/>
+              <a:t>Create/Update/Assign Record.</a:t>
+            </a:r>
+          </a:p>
+          <a:p>
+            <a:pPr lvl="1">
+              <a:buFont typeface="Courier New" panose="02070309020205020404" pitchFamily="49" charset="0"/>
+              <a:buChar char="o"/>
+            </a:pPr>
+            <a:r>
+              <a:rPr lang="en-US" dirty="0" smtClean="0"/>
+              <a:t>Send Email: can send email based on a template.</a:t>
+            </a:r>
+          </a:p>
+          <a:p>
+            <a:pPr lvl="1">
+              <a:buFont typeface="Courier New" panose="02070309020205020404" pitchFamily="49" charset="0"/>
+              <a:buChar char="o"/>
+            </a:pPr>
+            <a:r>
+              <a:rPr lang="en-US" dirty="0" smtClean="0"/>
+              <a:t>Start Child Workflow: usually used to perform a task outside the original selected entity.</a:t>
+            </a:r>
+          </a:p>
+          <a:p>
+            <a:pPr lvl="1">
+              <a:buFont typeface="Courier New" panose="02070309020205020404" pitchFamily="49" charset="0"/>
+              <a:buChar char="o"/>
+            </a:pPr>
+            <a:r>
+              <a:rPr lang="en-US" dirty="0" smtClean="0"/>
+              <a:t>Change Status.</a:t>
+            </a:r>
+          </a:p>
+          <a:p>
+            <a:pPr lvl="1">
+              <a:buFont typeface="Courier New" panose="02070309020205020404" pitchFamily="49" charset="0"/>
+              <a:buChar char="o"/>
+            </a:pPr>
+            <a:r>
+              <a:rPr lang="en-US" dirty="0" smtClean="0"/>
+              <a:t>Stop Workflow.</a:t>
+            </a:r>
+            <a:endParaRPr lang="en-US" dirty="0"/>
+          </a:p>
+        </p:txBody>
+      </p:sp>
+    </p:spTree>
+    <p:extLst>
+      <p:ext uri="{BB962C8B-B14F-4D97-AF65-F5344CB8AC3E}">
+        <p14:creationId xmlns:p14="http://schemas.microsoft.com/office/powerpoint/2010/main" val="1616700643"/>
+      </p:ext>
+    </p:extLst>
+  </p:cSld>
+  <p:clrMapOvr>
+    <a:masterClrMapping/>
+  </p:clrMapOvr>
+</p:sld>
+</file>
+
+<file path=ppt/slides/slide26.xml><?xml version="1.0" encoding="utf-8"?>
+<p:sld xmlns:a="http://schemas.openxmlformats.org/drawingml/2006/main" xmlns:r="http://schemas.openxmlformats.org/officeDocument/2006/relationships" xmlns:p="http://schemas.openxmlformats.org/presentationml/2006/main">
+  <p:cSld>
+    <p:spTree>
+      <p:nvGrpSpPr>
+        <p:cNvPr id="1" name=""/>
+        <p:cNvGrpSpPr/>
+        <p:nvPr/>
+      </p:nvGrpSpPr>
+      <p:grpSpPr>
+        <a:xfrm>
+          <a:off x="0" y="0"/>
+          <a:ext cx="0" cy="0"/>
+          <a:chOff x="0" y="0"/>
+          <a:chExt cx="0" cy="0"/>
+        </a:xfrm>
+      </p:grpSpPr>
+      <p:sp>
+        <p:nvSpPr>
+          <p:cNvPr id="2" name="Title 1"/>
+          <p:cNvSpPr>
+            <a:spLocks noGrp="1"/>
+          </p:cNvSpPr>
+          <p:nvPr>
+            <p:ph type="title"/>
+          </p:nvPr>
+        </p:nvSpPr>
+        <p:spPr/>
+        <p:txBody>
+          <a:bodyPr/>
+          <a:lstStyle/>
+          <a:p>
+            <a:r>
+              <a:rPr lang="en-US" dirty="0" smtClean="0"/>
+              <a:t>Infinite loops</a:t>
+            </a:r>
+            <a:endParaRPr lang="en-US" dirty="0"/>
+          </a:p>
+        </p:txBody>
+      </p:sp>
+      <p:sp>
+        <p:nvSpPr>
+          <p:cNvPr id="3" name="Content Placeholder 2"/>
+          <p:cNvSpPr>
+            <a:spLocks noGrp="1"/>
+          </p:cNvSpPr>
+          <p:nvPr>
+            <p:ph idx="1"/>
+          </p:nvPr>
+        </p:nvSpPr>
+        <p:spPr/>
+        <p:txBody>
+          <a:bodyPr/>
+          <a:lstStyle/>
+          <a:p>
+            <a:r>
+              <a:rPr lang="en-US" dirty="0" smtClean="0"/>
+              <a:t>If workflow loop more than 16 times in 10 minutes, it will be marked as infinite loops and will be stopped.</a:t>
+            </a:r>
+            <a:endParaRPr lang="en-US" dirty="0"/>
+          </a:p>
+        </p:txBody>
+      </p:sp>
+    </p:spTree>
+    <p:extLst>
+      <p:ext uri="{BB962C8B-B14F-4D97-AF65-F5344CB8AC3E}">
+        <p14:creationId xmlns:p14="http://schemas.microsoft.com/office/powerpoint/2010/main" val="1116802026"/>
+      </p:ext>
+    </p:extLst>
+  </p:cSld>
+  <p:clrMapOvr>
+    <a:masterClrMapping/>
+  </p:clrMapOvr>
+</p:sld>
+</file>
+
+<file path=ppt/slides/slide27.xml><?xml version="1.0" encoding="utf-8"?>
+<p:sld xmlns:a="http://schemas.openxmlformats.org/drawingml/2006/main" xmlns:r="http://schemas.openxmlformats.org/officeDocument/2006/relationships" xmlns:p="http://schemas.openxmlformats.org/presentationml/2006/main">
+  <p:cSld>
+    <p:spTree>
+      <p:nvGrpSpPr>
+        <p:cNvPr id="1" name=""/>
+        <p:cNvGrpSpPr/>
+        <p:nvPr/>
+      </p:nvGrpSpPr>
+      <p:grpSpPr>
+        <a:xfrm>
+          <a:off x="0" y="0"/>
+          <a:ext cx="0" cy="0"/>
+          <a:chOff x="0" y="0"/>
+          <a:chExt cx="0" cy="0"/>
+        </a:xfrm>
+      </p:grpSpPr>
+      <p:sp>
+        <p:nvSpPr>
+          <p:cNvPr id="2" name="Title 1"/>
+          <p:cNvSpPr>
+            <a:spLocks noGrp="1"/>
+          </p:cNvSpPr>
+          <p:nvPr>
+            <p:ph type="title"/>
+          </p:nvPr>
+        </p:nvSpPr>
+        <p:spPr/>
+        <p:txBody>
+          <a:bodyPr/>
+          <a:lstStyle/>
+          <a:p>
+            <a:r>
+              <a:rPr lang="en-US" dirty="0" smtClean="0"/>
+              <a:t>Monitoring Workflow Status</a:t>
+            </a:r>
+            <a:endParaRPr lang="en-US" dirty="0"/>
+          </a:p>
+        </p:txBody>
+      </p:sp>
+      <p:sp>
+        <p:nvSpPr>
+          <p:cNvPr id="3" name="Content Placeholder 2"/>
+          <p:cNvSpPr>
+            <a:spLocks noGrp="1"/>
+          </p:cNvSpPr>
+          <p:nvPr>
+            <p:ph idx="1"/>
+          </p:nvPr>
+        </p:nvSpPr>
+        <p:spPr/>
+        <p:txBody>
+          <a:bodyPr/>
+          <a:lstStyle/>
+          <a:p>
+            <a:r>
+              <a:rPr lang="en-US" dirty="0" smtClean="0"/>
+              <a:t>Check the progress of running workflows for errors &amp; logic.</a:t>
+            </a:r>
+          </a:p>
+          <a:p>
+            <a:r>
+              <a:rPr lang="en-US" dirty="0" smtClean="0"/>
+              <a:t>Settings =&gt; System Jobs.</a:t>
+            </a:r>
+            <a:endParaRPr lang="en-US" dirty="0"/>
+          </a:p>
+        </p:txBody>
+      </p:sp>
+    </p:spTree>
+    <p:extLst>
+      <p:ext uri="{BB962C8B-B14F-4D97-AF65-F5344CB8AC3E}">
+        <p14:creationId xmlns:p14="http://schemas.microsoft.com/office/powerpoint/2010/main" val="2313608981"/>
+      </p:ext>
+    </p:extLst>
+  </p:cSld>
+  <p:clrMapOvr>
+    <a:masterClrMapping/>
+  </p:clrMapOvr>
+</p:sld>
+</file>
+
+<file path=ppt/slides/slide28.xml><?xml version="1.0" encoding="utf-8"?>
+<p:sld xmlns:a="http://schemas.openxmlformats.org/drawingml/2006/main" xmlns:r="http://schemas.openxmlformats.org/officeDocument/2006/relationships" xmlns:p="http://schemas.openxmlformats.org/presentationml/2006/main">
+  <p:cSld>
+    <p:spTree>
+      <p:nvGrpSpPr>
+        <p:cNvPr id="1" name=""/>
+        <p:cNvGrpSpPr/>
+        <p:nvPr/>
+      </p:nvGrpSpPr>
+      <p:grpSpPr>
+        <a:xfrm>
+          <a:off x="0" y="0"/>
+          <a:ext cx="0" cy="0"/>
+          <a:chOff x="0" y="0"/>
+          <a:chExt cx="0" cy="0"/>
+        </a:xfrm>
+      </p:grpSpPr>
+      <p:sp>
+        <p:nvSpPr>
+          <p:cNvPr id="2" name="Title 1"/>
+          <p:cNvSpPr>
+            <a:spLocks noGrp="1"/>
+          </p:cNvSpPr>
+          <p:nvPr>
+            <p:ph type="title"/>
+          </p:nvPr>
+        </p:nvSpPr>
+        <p:spPr/>
+        <p:txBody>
+          <a:bodyPr/>
+          <a:lstStyle/>
+          <a:p>
+            <a:r>
+              <a:rPr lang="en-US" dirty="0" smtClean="0"/>
+              <a:t>Customize Chart &amp; Dashboard</a:t>
+            </a:r>
+            <a:endParaRPr lang="en-US" dirty="0"/>
+          </a:p>
+        </p:txBody>
+      </p:sp>
+      <p:sp>
+        <p:nvSpPr>
+          <p:cNvPr id="3" name="Content Placeholder 2"/>
+          <p:cNvSpPr>
+            <a:spLocks noGrp="1"/>
+          </p:cNvSpPr>
+          <p:nvPr>
+            <p:ph idx="1"/>
+          </p:nvPr>
+        </p:nvSpPr>
+        <p:spPr/>
+        <p:txBody>
+          <a:bodyPr/>
+          <a:lstStyle/>
+          <a:p>
+            <a:r>
+              <a:rPr lang="en-US" dirty="0" smtClean="0"/>
+              <a:t>Chart &amp; Dashboard characteristics.</a:t>
+            </a:r>
+          </a:p>
+          <a:p>
+            <a:r>
+              <a:rPr lang="en-US" dirty="0" smtClean="0"/>
+              <a:t>Types of chart.</a:t>
+            </a:r>
+            <a:endParaRPr lang="en-US" dirty="0"/>
+          </a:p>
+        </p:txBody>
+      </p:sp>
+    </p:spTree>
+    <p:extLst>
+      <p:ext uri="{BB962C8B-B14F-4D97-AF65-F5344CB8AC3E}">
+        <p14:creationId xmlns:p14="http://schemas.microsoft.com/office/powerpoint/2010/main" val="2393052909"/>
+      </p:ext>
+    </p:extLst>
+  </p:cSld>
+  <p:clrMapOvr>
+    <a:masterClrMapping/>
+  </p:clrMapOvr>
+</p:sld>
+</file>
+
+<file path=ppt/slides/slide29.xml><?xml version="1.0" encoding="utf-8"?>
+<p:sld xmlns:a="http://schemas.openxmlformats.org/drawingml/2006/main" xmlns:r="http://schemas.openxmlformats.org/officeDocument/2006/relationships" xmlns:p="http://schemas.openxmlformats.org/presentationml/2006/main">
+  <p:cSld>
+    <p:spTree>
+      <p:nvGrpSpPr>
+        <p:cNvPr id="1" name=""/>
+        <p:cNvGrpSpPr/>
+        <p:nvPr/>
+      </p:nvGrpSpPr>
+      <p:grpSpPr>
+        <a:xfrm>
+          <a:off x="0" y="0"/>
+          <a:ext cx="0" cy="0"/>
+          <a:chOff x="0" y="0"/>
+          <a:chExt cx="0" cy="0"/>
+        </a:xfrm>
+      </p:grpSpPr>
+      <p:sp>
+        <p:nvSpPr>
+          <p:cNvPr id="2" name="Title 1"/>
+          <p:cNvSpPr>
+            <a:spLocks noGrp="1"/>
+          </p:cNvSpPr>
+          <p:nvPr>
+            <p:ph type="title"/>
+          </p:nvPr>
+        </p:nvSpPr>
+        <p:spPr/>
+        <p:txBody>
+          <a:bodyPr/>
+          <a:lstStyle/>
+          <a:p>
+            <a:r>
+              <a:rPr lang="en-US" dirty="0" smtClean="0"/>
+              <a:t>Chart &amp; Dashboard Characteristic</a:t>
+            </a:r>
+            <a:endParaRPr lang="en-US" dirty="0"/>
+          </a:p>
+        </p:txBody>
+      </p:sp>
+      <p:sp>
+        <p:nvSpPr>
+          <p:cNvPr id="3" name="Content Placeholder 2"/>
+          <p:cNvSpPr>
+            <a:spLocks noGrp="1"/>
+          </p:cNvSpPr>
+          <p:nvPr>
+            <p:ph idx="1"/>
+          </p:nvPr>
+        </p:nvSpPr>
+        <p:spPr/>
+        <p:txBody>
+          <a:bodyPr/>
+          <a:lstStyle/>
+          <a:p>
+            <a:r>
+              <a:rPr lang="en-US" dirty="0" smtClean="0"/>
+              <a:t>Chart:</a:t>
+            </a:r>
+          </a:p>
+          <a:p>
+            <a:pPr lvl="1">
+              <a:buFont typeface="Courier New" panose="02070309020205020404" pitchFamily="49" charset="0"/>
+              <a:buChar char="o"/>
+            </a:pPr>
+            <a:r>
+              <a:rPr lang="en-US" dirty="0" smtClean="0"/>
+              <a:t>Graphic </a:t>
+            </a:r>
+            <a:r>
+              <a:rPr lang="en-US" dirty="0"/>
+              <a:t>representation of data from multiple records of an entity.</a:t>
+            </a:r>
+          </a:p>
+          <a:p>
+            <a:pPr lvl="1">
+              <a:buFont typeface="Courier New" panose="02070309020205020404" pitchFamily="49" charset="0"/>
+              <a:buChar char="o"/>
+            </a:pPr>
+            <a:r>
+              <a:rPr lang="en-US" dirty="0"/>
+              <a:t>Build from query on data</a:t>
+            </a:r>
+            <a:r>
+              <a:rPr lang="en-US" dirty="0" smtClean="0"/>
+              <a:t>.</a:t>
+            </a:r>
+          </a:p>
+          <a:p>
+            <a:r>
+              <a:rPr lang="en-US" dirty="0" smtClean="0"/>
+              <a:t>Dashboard:</a:t>
+            </a:r>
+          </a:p>
+          <a:p>
+            <a:pPr lvl="1">
+              <a:buFont typeface="Courier New" panose="02070309020205020404" pitchFamily="49" charset="0"/>
+              <a:buChar char="o"/>
+            </a:pPr>
+            <a:r>
+              <a:rPr lang="en-US" dirty="0" smtClean="0"/>
+              <a:t>Quick report.</a:t>
+            </a:r>
+          </a:p>
+          <a:p>
+            <a:pPr lvl="1">
+              <a:buFont typeface="Courier New" panose="02070309020205020404" pitchFamily="49" charset="0"/>
+              <a:buChar char="o"/>
+            </a:pPr>
+            <a:r>
+              <a:rPr lang="en-US" dirty="0" smtClean="0"/>
+              <a:t>A set of charts, views, web resources, </a:t>
+            </a:r>
+            <a:r>
+              <a:rPr lang="en-US" dirty="0" err="1" smtClean="0"/>
+              <a:t>iFrames</a:t>
+            </a:r>
+            <a:r>
+              <a:rPr lang="en-US" dirty="0" smtClean="0"/>
+              <a:t>.</a:t>
+            </a:r>
+          </a:p>
+          <a:p>
+            <a:pPr lvl="1">
+              <a:buFont typeface="Courier New" panose="02070309020205020404" pitchFamily="49" charset="0"/>
+              <a:buChar char="o"/>
+            </a:pPr>
+            <a:r>
+              <a:rPr lang="en-US" dirty="0" smtClean="0"/>
+              <a:t>Shown when user logged in.</a:t>
+            </a:r>
+          </a:p>
+          <a:p>
+            <a:pPr lvl="1">
+              <a:buFont typeface="Courier New" panose="02070309020205020404" pitchFamily="49" charset="0"/>
+              <a:buChar char="o"/>
+            </a:pPr>
+            <a:r>
+              <a:rPr lang="en-US" dirty="0" smtClean="0"/>
+              <a:t>Can set a dashboard to default.</a:t>
+            </a:r>
+            <a:endParaRPr lang="en-US" dirty="0"/>
+          </a:p>
+        </p:txBody>
+      </p:sp>
+    </p:spTree>
+    <p:extLst>
+      <p:ext uri="{BB962C8B-B14F-4D97-AF65-F5344CB8AC3E}">
+        <p14:creationId xmlns:p14="http://schemas.microsoft.com/office/powerpoint/2010/main" val="2177572340"/>
+      </p:ext>
+    </p:extLst>
+  </p:cSld>
+  <p:clrMapOvr>
+    <a:masterClrMapping/>
+  </p:clrMapOvr>
+</p:sld>
+</file>
+
+<file path=ppt/slides/slide3.xml><?xml version="1.0" encoding="utf-8"?>
+<p:sld xmlns:a="http://schemas.openxmlformats.org/drawingml/2006/main" xmlns:r="http://schemas.openxmlformats.org/officeDocument/2006/relationships" xmlns:p="http://schemas.openxmlformats.org/presentationml/2006/main">
+  <p:cSld>
+    <p:spTree>
+      <p:nvGrpSpPr>
+        <p:cNvPr id="1" name=""/>
+        <p:cNvGrpSpPr/>
+        <p:nvPr/>
+      </p:nvGrpSpPr>
+      <p:grpSpPr>
+        <a:xfrm>
+          <a:off x="0" y="0"/>
+          <a:ext cx="0" cy="0"/>
+          <a:chOff x="0" y="0"/>
+          <a:chExt cx="0" cy="0"/>
+        </a:xfrm>
+      </p:grpSpPr>
+      <p:sp>
+        <p:nvSpPr>
+          <p:cNvPr id="2" name="Title 1"/>
+          <p:cNvSpPr>
+            <a:spLocks noGrp="1"/>
+          </p:cNvSpPr>
+          <p:nvPr>
+            <p:ph type="title"/>
+          </p:nvPr>
+        </p:nvSpPr>
+        <p:spPr/>
+        <p:txBody>
+          <a:bodyPr/>
+          <a:lstStyle/>
+          <a:p>
+            <a:r>
               <a:rPr lang="en-US" dirty="0" smtClean="0"/>
               <a:t>Customizing Fields</a:t>
             </a:r>
@@ -3108,26 +5562,11 @@
           <a:p>
             <a:r>
               <a:rPr lang="en-US" dirty="0" smtClean="0"/>
-              <a:t>Calculated </a:t>
-            </a:r>
-            <a:r>
-              <a:rPr lang="en-US" dirty="0"/>
-              <a:t>field &amp; </a:t>
-            </a:r>
-            <a:r>
-              <a:rPr lang="en-US"/>
-              <a:t>Rollup </a:t>
-            </a:r>
-            <a:r>
-              <a:rPr lang="en-US" smtClean="0"/>
-              <a:t>field.</a:t>
-            </a:r>
-            <a:endParaRPr lang="en-US" dirty="0" smtClean="0"/>
-          </a:p>
-          <a:p>
-            <a:r>
-              <a:rPr lang="en-US" dirty="0" smtClean="0"/>
-              <a:t>Key options.</a:t>
+              <a:t>Key </a:t>
+            </a:r>
+            <a:r>
+              <a:rPr lang="en-US" dirty="0" smtClean="0"/>
+              <a:t>options.</a:t>
             </a:r>
           </a:p>
           <a:p>
@@ -3151,7 +5590,90 @@
 </p:sld>
 </file>
 
-<file path=ppt/slides/slide3.xml><?xml version="1.0" encoding="utf-8"?>
+<file path=ppt/slides/slide30.xml><?xml version="1.0" encoding="utf-8"?>
+<p:sld xmlns:a="http://schemas.openxmlformats.org/drawingml/2006/main" xmlns:r="http://schemas.openxmlformats.org/officeDocument/2006/relationships" xmlns:p="http://schemas.openxmlformats.org/presentationml/2006/main">
+  <p:cSld>
+    <p:spTree>
+      <p:nvGrpSpPr>
+        <p:cNvPr id="1" name=""/>
+        <p:cNvGrpSpPr/>
+        <p:nvPr/>
+      </p:nvGrpSpPr>
+      <p:grpSpPr>
+        <a:xfrm>
+          <a:off x="0" y="0"/>
+          <a:ext cx="0" cy="0"/>
+          <a:chOff x="0" y="0"/>
+          <a:chExt cx="0" cy="0"/>
+        </a:xfrm>
+      </p:grpSpPr>
+      <p:sp>
+        <p:nvSpPr>
+          <p:cNvPr id="2" name="Title 1"/>
+          <p:cNvSpPr>
+            <a:spLocks noGrp="1"/>
+          </p:cNvSpPr>
+          <p:nvPr>
+            <p:ph type="title"/>
+          </p:nvPr>
+        </p:nvSpPr>
+        <p:spPr/>
+        <p:txBody>
+          <a:bodyPr/>
+          <a:lstStyle/>
+          <a:p>
+            <a:r>
+              <a:rPr lang="en-US" dirty="0" smtClean="0"/>
+              <a:t>Types of Chart</a:t>
+            </a:r>
+            <a:endParaRPr lang="en-US" dirty="0"/>
+          </a:p>
+        </p:txBody>
+      </p:sp>
+      <p:sp>
+        <p:nvSpPr>
+          <p:cNvPr id="3" name="Content Placeholder 2"/>
+          <p:cNvSpPr>
+            <a:spLocks noGrp="1"/>
+          </p:cNvSpPr>
+          <p:nvPr>
+            <p:ph idx="1"/>
+          </p:nvPr>
+        </p:nvSpPr>
+        <p:spPr/>
+        <p:txBody>
+          <a:bodyPr/>
+          <a:lstStyle/>
+          <a:p>
+            <a:r>
+              <a:rPr lang="en-US" dirty="0" smtClean="0"/>
+              <a:t>System chart: created by System Administrator or System Customizer. These charts are by default visible to all users.</a:t>
+            </a:r>
+          </a:p>
+          <a:p>
+            <a:pPr algn="just"/>
+            <a:r>
+              <a:rPr lang="en-US" dirty="0" smtClean="0"/>
+              <a:t>User chart: created by any user. Only visible to owner and shared user.</a:t>
+            </a:r>
+            <a:endParaRPr lang="en-US" dirty="0"/>
+          </a:p>
+        </p:txBody>
+      </p:sp>
+    </p:spTree>
+    <p:extLst>
+      <p:ext uri="{BB962C8B-B14F-4D97-AF65-F5344CB8AC3E}">
+        <p14:creationId xmlns:p14="http://schemas.microsoft.com/office/powerpoint/2010/main" val="3905638433"/>
+      </p:ext>
+    </p:extLst>
+  </p:cSld>
+  <p:clrMapOvr>
+    <a:masterClrMapping/>
+  </p:clrMapOvr>
+</p:sld>
+</file>
+
+<file path=ppt/slides/slide4.xml><?xml version="1.0" encoding="utf-8"?>
 <p:sld xmlns:a="http://schemas.openxmlformats.org/drawingml/2006/main" xmlns:r="http://schemas.openxmlformats.org/officeDocument/2006/relationships" xmlns:p="http://schemas.openxmlformats.org/presentationml/2006/main">
   <p:cSld>
     <p:spTree>
@@ -3542,106 +6064,6 @@
 </p:sld>
 </file>
 
-<file path=ppt/slides/slide4.xml><?xml version="1.0" encoding="utf-8"?>
-<p:sld xmlns:a="http://schemas.openxmlformats.org/drawingml/2006/main" xmlns:r="http://schemas.openxmlformats.org/officeDocument/2006/relationships" xmlns:p="http://schemas.openxmlformats.org/presentationml/2006/main">
-  <p:cSld>
-    <p:spTree>
-      <p:nvGrpSpPr>
-        <p:cNvPr id="1" name=""/>
-        <p:cNvGrpSpPr/>
-        <p:nvPr/>
-      </p:nvGrpSpPr>
-      <p:grpSpPr>
-        <a:xfrm>
-          <a:off x="0" y="0"/>
-          <a:ext cx="0" cy="0"/>
-          <a:chOff x="0" y="0"/>
-          <a:chExt cx="0" cy="0"/>
-        </a:xfrm>
-      </p:grpSpPr>
-      <p:sp>
-        <p:nvSpPr>
-          <p:cNvPr id="2" name="Title 1"/>
-          <p:cNvSpPr>
-            <a:spLocks noGrp="1"/>
-          </p:cNvSpPr>
-          <p:nvPr>
-            <p:ph type="title"/>
-          </p:nvPr>
-        </p:nvSpPr>
-        <p:spPr/>
-        <p:txBody>
-          <a:bodyPr/>
-          <a:lstStyle/>
-          <a:p>
-            <a:r>
-              <a:rPr lang="en-US" dirty="0" smtClean="0"/>
-              <a:t>Field Types</a:t>
-            </a:r>
-            <a:endParaRPr lang="en-US" dirty="0"/>
-          </a:p>
-        </p:txBody>
-      </p:sp>
-      <p:sp>
-        <p:nvSpPr>
-          <p:cNvPr id="3" name="Content Placeholder 2"/>
-          <p:cNvSpPr>
-            <a:spLocks noGrp="1"/>
-          </p:cNvSpPr>
-          <p:nvPr>
-            <p:ph idx="1"/>
-          </p:nvPr>
-        </p:nvSpPr>
-        <p:spPr/>
-        <p:txBody>
-          <a:bodyPr/>
-          <a:lstStyle/>
-          <a:p>
-            <a:r>
-              <a:rPr lang="en-US" dirty="0" smtClean="0"/>
-              <a:t>Simple: no formula.</a:t>
-            </a:r>
-          </a:p>
-          <a:p>
-            <a:r>
-              <a:rPr lang="en-US" dirty="0" smtClean="0"/>
-              <a:t>Calculated: calculated from current/parent entity fields.</a:t>
-            </a:r>
-          </a:p>
-          <a:p>
-            <a:r>
-              <a:rPr lang="en-US" dirty="0"/>
-              <a:t>Rollup: </a:t>
-            </a:r>
-            <a:r>
-              <a:rPr lang="en-US" dirty="0" smtClean="0"/>
-              <a:t>aggregate </a:t>
-            </a:r>
-            <a:r>
-              <a:rPr lang="en-US" dirty="0"/>
-              <a:t>value computed from the </a:t>
-            </a:r>
-            <a:r>
-              <a:rPr lang="en-US" dirty="0" smtClean="0"/>
-              <a:t>current entity or related entities.</a:t>
-            </a:r>
-            <a:endParaRPr lang="en-US" dirty="0"/>
-          </a:p>
-        </p:txBody>
-      </p:sp>
-    </p:spTree>
-    <p:extLst>
-      <p:ext uri="{BB962C8B-B14F-4D97-AF65-F5344CB8AC3E}">
-        <p14:creationId xmlns:p14="http://schemas.microsoft.com/office/powerpoint/2010/main" val="2468661252"/>
-      </p:ext>
-    </p:extLst>
-  </p:cSld>
-  <p:clrMapOvr>
-    <a:masterClrMapping/>
-  </p:clrMapOvr>
-</p:sld>
-</file>
-
 <file path=ppt/slides/slide5.xml><?xml version="1.0" encoding="utf-8"?>
 <p:sld xmlns:a="http://schemas.openxmlformats.org/drawingml/2006/main" xmlns:r="http://schemas.openxmlformats.org/officeDocument/2006/relationships" xmlns:p="http://schemas.openxmlformats.org/presentationml/2006/main">
   <p:cSld>
@@ -3675,48 +6097,865 @@
           <a:lstStyle/>
           <a:p>
             <a:r>
+              <a:rPr lang="en-US" dirty="0" smtClean="0"/>
+              <a:t>Field Types</a:t>
+            </a:r>
+            <a:endParaRPr lang="en-US" dirty="0"/>
+          </a:p>
+        </p:txBody>
+      </p:sp>
+      <p:sp>
+        <p:nvSpPr>
+          <p:cNvPr id="3" name="Content Placeholder 2"/>
+          <p:cNvSpPr>
+            <a:spLocks noGrp="1"/>
+          </p:cNvSpPr>
+          <p:nvPr>
+            <p:ph idx="1"/>
+          </p:nvPr>
+        </p:nvSpPr>
+        <p:spPr/>
+        <p:txBody>
+          <a:bodyPr/>
+          <a:lstStyle/>
+          <a:p>
+            <a:r>
+              <a:rPr lang="en-US" dirty="0" smtClean="0"/>
+              <a:t>Simple: no formula.</a:t>
+            </a:r>
+          </a:p>
+          <a:p>
+            <a:r>
+              <a:rPr lang="en-US" dirty="0" smtClean="0"/>
+              <a:t>Calculated: calculated from current/parent entity fields.</a:t>
+            </a:r>
+          </a:p>
+          <a:p>
+            <a:r>
               <a:rPr lang="en-US" dirty="0"/>
-              <a:t>Calculated </a:t>
-            </a:r>
-            <a:r>
-              <a:rPr lang="en-US" dirty="0" smtClean="0"/>
-              <a:t>Field </a:t>
+              <a:t>Rollup: </a:t>
+            </a:r>
+            <a:r>
+              <a:rPr lang="en-US" dirty="0" smtClean="0"/>
+              <a:t>aggregate </a:t>
             </a:r>
             <a:r>
               <a:rPr lang="en-US" dirty="0"/>
-              <a:t>&amp; Rollup </a:t>
-            </a:r>
-            <a:r>
-              <a:rPr lang="en-US" dirty="0" smtClean="0"/>
-              <a:t>Field</a:t>
+              <a:t>value computed from the </a:t>
+            </a:r>
+            <a:r>
+              <a:rPr lang="en-US" dirty="0" smtClean="0"/>
+              <a:t>current entity or related entities.</a:t>
             </a:r>
             <a:endParaRPr lang="en-US" dirty="0"/>
           </a:p>
         </p:txBody>
       </p:sp>
-      <p:sp>
-        <p:nvSpPr>
-          <p:cNvPr id="3" name="Content Placeholder 2"/>
-          <p:cNvSpPr>
-            <a:spLocks noGrp="1"/>
-          </p:cNvSpPr>
-          <p:nvPr>
-            <p:ph idx="1"/>
-          </p:nvPr>
-        </p:nvSpPr>
-        <p:spPr/>
-        <p:txBody>
-          <a:bodyPr/>
-          <a:lstStyle/>
-          <a:p>
-            <a:endParaRPr lang="en-US" dirty="0"/>
-          </a:p>
-        </p:txBody>
-      </p:sp>
+      <p:graphicFrame>
+        <p:nvGraphicFramePr>
+          <p:cNvPr id="4" name="Content Placeholder 3"/>
+          <p:cNvGraphicFramePr>
+            <a:graphicFrameLocks/>
+          </p:cNvGraphicFramePr>
+          <p:nvPr>
+            <p:extLst>
+              <p:ext uri="{D42A27DB-BD31-4B8C-83A1-F6EECF244321}">
+                <p14:modId xmlns:p14="http://schemas.microsoft.com/office/powerpoint/2010/main" val="916783320"/>
+              </p:ext>
+            </p:extLst>
+          </p:nvPr>
+        </p:nvGraphicFramePr>
+        <p:xfrm>
+          <a:off x="838200" y="3896472"/>
+          <a:ext cx="10515600" cy="1559560"/>
+        </p:xfrm>
+        <a:graphic>
+          <a:graphicData uri="http://schemas.openxmlformats.org/drawingml/2006/table">
+            <a:tbl>
+              <a:tblPr firstRow="1" bandRow="1">
+                <a:tableStyleId>{5C22544A-7EE6-4342-B048-85BDC9FD1C3A}</a:tableStyleId>
+              </a:tblPr>
+              <a:tblGrid>
+                <a:gridCol w="5257800"/>
+                <a:gridCol w="5257800"/>
+              </a:tblGrid>
+              <a:tr h="370840">
+                <a:tc>
+                  <a:txBody>
+                    <a:bodyPr/>
+                    <a:lstStyle/>
+                    <a:p>
+                      <a:pPr algn="ctr"/>
+                      <a:r>
+                        <a:rPr lang="en-US" dirty="0" smtClean="0"/>
+                        <a:t>Calculated Field</a:t>
+                      </a:r>
+                      <a:endParaRPr lang="en-US" dirty="0"/>
+                    </a:p>
+                  </a:txBody>
+                  <a:tcPr/>
+                </a:tc>
+                <a:tc>
+                  <a:txBody>
+                    <a:bodyPr/>
+                    <a:lstStyle/>
+                    <a:p>
+                      <a:pPr algn="ctr"/>
+                      <a:r>
+                        <a:rPr lang="en-US" dirty="0" smtClean="0"/>
+                        <a:t>Rollup Field</a:t>
+                      </a:r>
+                      <a:endParaRPr lang="en-US" dirty="0"/>
+                    </a:p>
+                  </a:txBody>
+                  <a:tcPr/>
+                </a:tc>
+              </a:tr>
+              <a:tr h="370840">
+                <a:tc>
+                  <a:txBody>
+                    <a:bodyPr/>
+                    <a:lstStyle/>
+                    <a:p>
+                      <a:r>
+                        <a:rPr lang="en-US" dirty="0" smtClean="0"/>
+                        <a:t>Update won’t trigger workflow.</a:t>
+                      </a:r>
+                    </a:p>
+                    <a:p>
+                      <a:r>
+                        <a:rPr lang="en-US" dirty="0" smtClean="0"/>
+                        <a:t>Only read,</a:t>
+                      </a:r>
+                      <a:r>
+                        <a:rPr lang="en-US" baseline="0" dirty="0" smtClean="0"/>
+                        <a:t> no create or update in plugins.</a:t>
+                      </a:r>
+                    </a:p>
+                    <a:p>
+                      <a:r>
+                        <a:rPr lang="en-US" baseline="0" dirty="0" smtClean="0"/>
+                        <a:t>Virtual and not stored in the database.</a:t>
+                      </a:r>
+                    </a:p>
+                    <a:p>
+                      <a:r>
+                        <a:rPr lang="en-US" baseline="0" dirty="0" smtClean="0"/>
+                        <a:t>Cannot mix AND/OR statements. Use only OR </a:t>
+                      </a:r>
+                      <a:r>
+                        <a:rPr lang="en-US" baseline="0" dirty="0" err="1" smtClean="0"/>
+                        <a:t>or</a:t>
+                      </a:r>
+                      <a:r>
+                        <a:rPr lang="en-US" baseline="0" dirty="0" smtClean="0"/>
+                        <a:t> AND. </a:t>
+                      </a:r>
+                      <a:endParaRPr lang="en-US" dirty="0"/>
+                    </a:p>
+                  </a:txBody>
+                  <a:tcPr/>
+                </a:tc>
+                <a:tc>
+                  <a:txBody>
+                    <a:bodyPr/>
+                    <a:lstStyle/>
+                    <a:p>
+                      <a:r>
+                        <a:rPr lang="en-US" dirty="0" smtClean="0"/>
+                        <a:t>Does not perform in real</a:t>
+                      </a:r>
+                      <a:r>
+                        <a:rPr lang="en-US" baseline="0" dirty="0" smtClean="0"/>
+                        <a:t> </a:t>
+                      </a:r>
+                      <a:r>
+                        <a:rPr lang="en-US" dirty="0" smtClean="0"/>
+                        <a:t>time.</a:t>
+                      </a:r>
+                    </a:p>
+                    <a:p>
+                      <a:r>
+                        <a:rPr lang="en-US" dirty="0" smtClean="0"/>
+                        <a:t>Stored in the database.</a:t>
+                      </a:r>
+                    </a:p>
+                    <a:p>
+                      <a:pPr algn="just"/>
+                      <a:r>
+                        <a:rPr lang="en-US" dirty="0" smtClean="0"/>
+                        <a:t>Recalculating will</a:t>
+                      </a:r>
+                      <a:r>
+                        <a:rPr lang="en-US" baseline="0" dirty="0" smtClean="0"/>
+                        <a:t> not trigger the update plugin context.</a:t>
+                      </a:r>
+                      <a:endParaRPr lang="en-US" dirty="0"/>
+                    </a:p>
+                  </a:txBody>
+                  <a:tcPr/>
+                </a:tc>
+              </a:tr>
+            </a:tbl>
+          </a:graphicData>
+        </a:graphic>
+      </p:graphicFrame>
     </p:spTree>
     <p:extLst>
       <p:ext uri="{BB962C8B-B14F-4D97-AF65-F5344CB8AC3E}">
-        <p14:creationId xmlns:p14="http://schemas.microsoft.com/office/powerpoint/2010/main" val="2970415242"/>
+        <p14:creationId xmlns:p14="http://schemas.microsoft.com/office/powerpoint/2010/main" val="2468661252"/>
+      </p:ext>
+    </p:extLst>
+  </p:cSld>
+  <p:clrMapOvr>
+    <a:masterClrMapping/>
+  </p:clrMapOvr>
+</p:sld>
+</file>
+
+<file path=ppt/slides/slide6.xml><?xml version="1.0" encoding="utf-8"?>
+<p:sld xmlns:a="http://schemas.openxmlformats.org/drawingml/2006/main" xmlns:r="http://schemas.openxmlformats.org/officeDocument/2006/relationships" xmlns:p="http://schemas.openxmlformats.org/presentationml/2006/main">
+  <p:cSld>
+    <p:spTree>
+      <p:nvGrpSpPr>
+        <p:cNvPr id="1" name=""/>
+        <p:cNvGrpSpPr/>
+        <p:nvPr/>
+      </p:nvGrpSpPr>
+      <p:grpSpPr>
+        <a:xfrm>
+          <a:off x="0" y="0"/>
+          <a:ext cx="0" cy="0"/>
+          <a:chOff x="0" y="0"/>
+          <a:chExt cx="0" cy="0"/>
+        </a:xfrm>
+      </p:grpSpPr>
+      <p:sp>
+        <p:nvSpPr>
+          <p:cNvPr id="2" name="Title 1"/>
+          <p:cNvSpPr>
+            <a:spLocks noGrp="1"/>
+          </p:cNvSpPr>
+          <p:nvPr>
+            <p:ph type="title"/>
+          </p:nvPr>
+        </p:nvSpPr>
+        <p:spPr/>
+        <p:txBody>
+          <a:bodyPr/>
+          <a:lstStyle/>
+          <a:p>
+            <a:r>
+              <a:rPr lang="en-US" dirty="0" smtClean="0"/>
+              <a:t>Key Options</a:t>
+            </a:r>
+            <a:endParaRPr lang="en-US" dirty="0"/>
+          </a:p>
+        </p:txBody>
+      </p:sp>
+      <p:sp>
+        <p:nvSpPr>
+          <p:cNvPr id="3" name="Content Placeholder 2"/>
+          <p:cNvSpPr>
+            <a:spLocks noGrp="1"/>
+          </p:cNvSpPr>
+          <p:nvPr>
+            <p:ph idx="1"/>
+          </p:nvPr>
+        </p:nvSpPr>
+        <p:spPr>
+          <a:xfrm>
+            <a:off x="838200" y="1825624"/>
+            <a:ext cx="10515600" cy="4749987"/>
+          </a:xfrm>
+        </p:spPr>
+        <p:txBody>
+          <a:bodyPr>
+            <a:normAutofit/>
+          </a:bodyPr>
+          <a:lstStyle/>
+          <a:p>
+            <a:r>
+              <a:rPr lang="en-US" dirty="0" smtClean="0"/>
+              <a:t>Field Type.</a:t>
+            </a:r>
+          </a:p>
+          <a:p>
+            <a:r>
+              <a:rPr lang="en-US" dirty="0" smtClean="0"/>
+              <a:t>Display Name: label for displaying in CRM.</a:t>
+            </a:r>
+          </a:p>
+          <a:p>
+            <a:r>
+              <a:rPr lang="en-US" dirty="0" smtClean="0"/>
+              <a:t>Name: column name in SQL Server.</a:t>
+            </a:r>
+          </a:p>
+          <a:p>
+            <a:r>
+              <a:rPr lang="en-US" dirty="0" smtClean="0"/>
+              <a:t>Field Security: non-customizable if enabled.</a:t>
+            </a:r>
+          </a:p>
+          <a:p>
+            <a:r>
+              <a:rPr lang="en-US" dirty="0" smtClean="0"/>
+              <a:t>Auditing.</a:t>
+            </a:r>
+          </a:p>
+          <a:p>
+            <a:r>
+              <a:rPr lang="en-US" dirty="0" smtClean="0"/>
+              <a:t>Field Requirement:</a:t>
+            </a:r>
+          </a:p>
+          <a:p>
+            <a:pPr lvl="1">
+              <a:buFont typeface="Courier New" panose="02070309020205020404" pitchFamily="49" charset="0"/>
+              <a:buChar char="o"/>
+            </a:pPr>
+            <a:r>
+              <a:rPr lang="en-US" dirty="0" smtClean="0"/>
+              <a:t>Business Required: must be filled in order to save.</a:t>
+            </a:r>
+          </a:p>
+          <a:p>
+            <a:pPr lvl="1">
+              <a:buFont typeface="Courier New" panose="02070309020205020404" pitchFamily="49" charset="0"/>
+              <a:buChar char="o"/>
+            </a:pPr>
+            <a:r>
+              <a:rPr lang="en-US" dirty="0" smtClean="0"/>
+              <a:t>Business Recommend.</a:t>
+            </a:r>
+          </a:p>
+          <a:p>
+            <a:pPr lvl="1">
+              <a:buFont typeface="Courier New" panose="02070309020205020404" pitchFamily="49" charset="0"/>
+              <a:buChar char="o"/>
+            </a:pPr>
+            <a:r>
+              <a:rPr lang="en-US" dirty="0" smtClean="0"/>
+              <a:t>Optional.</a:t>
+            </a:r>
+          </a:p>
+        </p:txBody>
+      </p:sp>
+    </p:spTree>
+    <p:extLst>
+      <p:ext uri="{BB962C8B-B14F-4D97-AF65-F5344CB8AC3E}">
+        <p14:creationId xmlns:p14="http://schemas.microsoft.com/office/powerpoint/2010/main" val="1249952333"/>
+      </p:ext>
+    </p:extLst>
+  </p:cSld>
+  <p:clrMapOvr>
+    <a:masterClrMapping/>
+  </p:clrMapOvr>
+</p:sld>
+</file>
+
+<file path=ppt/slides/slide7.xml><?xml version="1.0" encoding="utf-8"?>
+<p:sld xmlns:a="http://schemas.openxmlformats.org/drawingml/2006/main" xmlns:r="http://schemas.openxmlformats.org/officeDocument/2006/relationships" xmlns:p="http://schemas.openxmlformats.org/presentationml/2006/main">
+  <p:cSld>
+    <p:spTree>
+      <p:nvGrpSpPr>
+        <p:cNvPr id="1" name=""/>
+        <p:cNvGrpSpPr/>
+        <p:nvPr/>
+      </p:nvGrpSpPr>
+      <p:grpSpPr>
+        <a:xfrm>
+          <a:off x="0" y="0"/>
+          <a:ext cx="0" cy="0"/>
+          <a:chOff x="0" y="0"/>
+          <a:chExt cx="0" cy="0"/>
+        </a:xfrm>
+      </p:grpSpPr>
+      <p:sp>
+        <p:nvSpPr>
+          <p:cNvPr id="2" name="Title 1"/>
+          <p:cNvSpPr>
+            <a:spLocks noGrp="1"/>
+          </p:cNvSpPr>
+          <p:nvPr>
+            <p:ph type="title"/>
+          </p:nvPr>
+        </p:nvSpPr>
+        <p:spPr/>
+        <p:txBody>
+          <a:bodyPr/>
+          <a:lstStyle/>
+          <a:p>
+            <a:r>
+              <a:rPr lang="en-US" dirty="0" smtClean="0"/>
+              <a:t>Key Options</a:t>
+            </a:r>
+            <a:endParaRPr lang="en-US" dirty="0"/>
+          </a:p>
+        </p:txBody>
+      </p:sp>
+      <p:sp>
+        <p:nvSpPr>
+          <p:cNvPr id="3" name="Content Placeholder 2"/>
+          <p:cNvSpPr>
+            <a:spLocks noGrp="1"/>
+          </p:cNvSpPr>
+          <p:nvPr>
+            <p:ph idx="1"/>
+          </p:nvPr>
+        </p:nvSpPr>
+        <p:spPr/>
+        <p:txBody>
+          <a:bodyPr/>
+          <a:lstStyle/>
+          <a:p>
+            <a:r>
+              <a:rPr lang="en-US" dirty="0" smtClean="0"/>
+              <a:t>Searchable.</a:t>
+            </a:r>
+          </a:p>
+          <a:p>
+            <a:r>
+              <a:rPr lang="en-US" dirty="0" smtClean="0"/>
+              <a:t>Description.</a:t>
+            </a:r>
+          </a:p>
+          <a:p>
+            <a:r>
+              <a:rPr lang="en-US" dirty="0" smtClean="0"/>
+              <a:t>Data Type.</a:t>
+            </a:r>
+          </a:p>
+        </p:txBody>
+      </p:sp>
+    </p:spTree>
+    <p:extLst>
+      <p:ext uri="{BB962C8B-B14F-4D97-AF65-F5344CB8AC3E}">
+        <p14:creationId xmlns:p14="http://schemas.microsoft.com/office/powerpoint/2010/main" val="1656724428"/>
+      </p:ext>
+    </p:extLst>
+  </p:cSld>
+  <p:clrMapOvr>
+    <a:masterClrMapping/>
+  </p:clrMapOvr>
+</p:sld>
+</file>
+
+<file path=ppt/slides/slide8.xml><?xml version="1.0" encoding="utf-8"?>
+<p:sld xmlns:a="http://schemas.openxmlformats.org/drawingml/2006/main" xmlns:r="http://schemas.openxmlformats.org/officeDocument/2006/relationships" xmlns:p="http://schemas.openxmlformats.org/presentationml/2006/main">
+  <p:cSld>
+    <p:spTree>
+      <p:nvGrpSpPr>
+        <p:cNvPr id="1" name=""/>
+        <p:cNvGrpSpPr/>
+        <p:nvPr/>
+      </p:nvGrpSpPr>
+      <p:grpSpPr>
+        <a:xfrm>
+          <a:off x="0" y="0"/>
+          <a:ext cx="0" cy="0"/>
+          <a:chOff x="0" y="0"/>
+          <a:chExt cx="0" cy="0"/>
+        </a:xfrm>
+      </p:grpSpPr>
+      <p:sp>
+        <p:nvSpPr>
+          <p:cNvPr id="2" name="Title 1"/>
+          <p:cNvSpPr>
+            <a:spLocks noGrp="1"/>
+          </p:cNvSpPr>
+          <p:nvPr>
+            <p:ph type="title"/>
+          </p:nvPr>
+        </p:nvSpPr>
+        <p:spPr/>
+        <p:txBody>
+          <a:bodyPr/>
+          <a:lstStyle/>
+          <a:p>
+            <a:r>
+              <a:rPr lang="en-US" dirty="0" smtClean="0"/>
+              <a:t>Data Type</a:t>
+            </a:r>
+            <a:endParaRPr lang="en-US" dirty="0"/>
+          </a:p>
+        </p:txBody>
+      </p:sp>
+      <p:graphicFrame>
+        <p:nvGraphicFramePr>
+          <p:cNvPr id="4" name="Content Placeholder 3"/>
+          <p:cNvGraphicFramePr>
+            <a:graphicFrameLocks noGrp="1"/>
+          </p:cNvGraphicFramePr>
+          <p:nvPr>
+            <p:ph idx="1"/>
+            <p:extLst>
+              <p:ext uri="{D42A27DB-BD31-4B8C-83A1-F6EECF244321}">
+                <p14:modId xmlns:p14="http://schemas.microsoft.com/office/powerpoint/2010/main" val="965002424"/>
+              </p:ext>
+            </p:extLst>
+          </p:nvPr>
+        </p:nvGraphicFramePr>
+        <p:xfrm>
+          <a:off x="838200" y="1825625"/>
+          <a:ext cx="10515600" cy="1559560"/>
+        </p:xfrm>
+        <a:graphic>
+          <a:graphicData uri="http://schemas.openxmlformats.org/drawingml/2006/table">
+            <a:tbl>
+              <a:tblPr firstRow="1" bandRow="1">
+                <a:tableStyleId>{5C22544A-7EE6-4342-B048-85BDC9FD1C3A}</a:tableStyleId>
+              </a:tblPr>
+              <a:tblGrid>
+                <a:gridCol w="2375647"/>
+                <a:gridCol w="2232212"/>
+                <a:gridCol w="1949823"/>
+                <a:gridCol w="1854798"/>
+                <a:gridCol w="2103120"/>
+              </a:tblGrid>
+              <a:tr h="370840">
+                <a:tc>
+                  <a:txBody>
+                    <a:bodyPr/>
+                    <a:lstStyle/>
+                    <a:p>
+                      <a:pPr algn="ctr"/>
+                      <a:r>
+                        <a:rPr lang="en-US" dirty="0" smtClean="0"/>
+                        <a:t>Numeric</a:t>
+                      </a:r>
+                      <a:endParaRPr lang="en-US" dirty="0"/>
+                    </a:p>
+                  </a:txBody>
+                  <a:tcPr/>
+                </a:tc>
+                <a:tc>
+                  <a:txBody>
+                    <a:bodyPr/>
+                    <a:lstStyle/>
+                    <a:p>
+                      <a:pPr algn="ctr"/>
+                      <a:r>
+                        <a:rPr lang="en-US" dirty="0" smtClean="0"/>
+                        <a:t>Text</a:t>
+                      </a:r>
+                      <a:endParaRPr lang="en-US" dirty="0"/>
+                    </a:p>
+                  </a:txBody>
+                  <a:tcPr/>
+                </a:tc>
+                <a:tc>
+                  <a:txBody>
+                    <a:bodyPr/>
+                    <a:lstStyle/>
+                    <a:p>
+                      <a:pPr algn="ctr"/>
+                      <a:r>
+                        <a:rPr lang="en-US" dirty="0" smtClean="0"/>
+                        <a:t>Other</a:t>
+                      </a:r>
+                      <a:endParaRPr lang="en-US" dirty="0"/>
+                    </a:p>
+                  </a:txBody>
+                  <a:tcPr/>
+                </a:tc>
+                <a:tc>
+                  <a:txBody>
+                    <a:bodyPr/>
+                    <a:lstStyle/>
+                    <a:p>
+                      <a:pPr algn="ctr"/>
+                      <a:r>
+                        <a:rPr lang="en-US" dirty="0" smtClean="0"/>
+                        <a:t>Entity</a:t>
+                      </a:r>
+                      <a:endParaRPr lang="en-US" dirty="0"/>
+                    </a:p>
+                  </a:txBody>
+                  <a:tcPr/>
+                </a:tc>
+                <a:tc>
+                  <a:txBody>
+                    <a:bodyPr/>
+                    <a:lstStyle/>
+                    <a:p>
+                      <a:pPr algn="ctr"/>
+                      <a:r>
+                        <a:rPr lang="en-US" dirty="0" smtClean="0"/>
+                        <a:t>Options</a:t>
+                      </a:r>
+                      <a:endParaRPr lang="en-US" dirty="0"/>
+                    </a:p>
+                  </a:txBody>
+                  <a:tcPr/>
+                </a:tc>
+              </a:tr>
+              <a:tr h="370840">
+                <a:tc>
+                  <a:txBody>
+                    <a:bodyPr/>
+                    <a:lstStyle/>
+                    <a:p>
+                      <a:r>
+                        <a:rPr lang="en-US" dirty="0" smtClean="0"/>
+                        <a:t>Floating Point Number</a:t>
+                      </a:r>
+                    </a:p>
+                    <a:p>
+                      <a:r>
+                        <a:rPr lang="en-US" dirty="0" smtClean="0"/>
+                        <a:t>Decimal Number</a:t>
+                      </a:r>
+                    </a:p>
+                    <a:p>
+                      <a:r>
+                        <a:rPr lang="en-US" dirty="0" smtClean="0"/>
+                        <a:t>Whole Number</a:t>
+                      </a:r>
+                      <a:endParaRPr lang="en-US" dirty="0"/>
+                    </a:p>
+                  </a:txBody>
+                  <a:tcPr/>
+                </a:tc>
+                <a:tc>
+                  <a:txBody>
+                    <a:bodyPr/>
+                    <a:lstStyle/>
+                    <a:p>
+                      <a:r>
+                        <a:rPr lang="en-US" dirty="0" smtClean="0"/>
+                        <a:t>Single Line of Text</a:t>
+                      </a:r>
+                    </a:p>
+                    <a:p>
+                      <a:r>
+                        <a:rPr lang="en-US" dirty="0" smtClean="0"/>
+                        <a:t>Multiple Lines of Text</a:t>
+                      </a:r>
+                      <a:endParaRPr lang="en-US" dirty="0"/>
+                    </a:p>
+                  </a:txBody>
+                  <a:tcPr/>
+                </a:tc>
+                <a:tc>
+                  <a:txBody>
+                    <a:bodyPr/>
+                    <a:lstStyle/>
+                    <a:p>
+                      <a:r>
+                        <a:rPr lang="en-US" dirty="0" smtClean="0"/>
+                        <a:t>Image</a:t>
+                      </a:r>
+                    </a:p>
+                    <a:p>
+                      <a:r>
+                        <a:rPr lang="en-US" dirty="0" smtClean="0"/>
+                        <a:t>Currency</a:t>
+                      </a:r>
+                    </a:p>
+                    <a:p>
+                      <a:r>
+                        <a:rPr lang="en-US" dirty="0" smtClean="0"/>
+                        <a:t>Date and Time</a:t>
+                      </a:r>
+                      <a:endParaRPr lang="en-US" dirty="0"/>
+                    </a:p>
+                  </a:txBody>
+                  <a:tcPr/>
+                </a:tc>
+                <a:tc>
+                  <a:txBody>
+                    <a:bodyPr/>
+                    <a:lstStyle/>
+                    <a:p>
+                      <a:r>
+                        <a:rPr lang="en-US" dirty="0" smtClean="0"/>
+                        <a:t>Lookup</a:t>
+                      </a:r>
+                      <a:endParaRPr lang="en-US" baseline="0" dirty="0" smtClean="0"/>
+                    </a:p>
+                    <a:p>
+                      <a:r>
+                        <a:rPr lang="en-US" baseline="0" dirty="0" smtClean="0"/>
+                        <a:t>Customer</a:t>
+                      </a:r>
+                      <a:endParaRPr lang="en-US" dirty="0"/>
+                    </a:p>
+                  </a:txBody>
+                  <a:tcPr/>
+                </a:tc>
+                <a:tc>
+                  <a:txBody>
+                    <a:bodyPr/>
+                    <a:lstStyle/>
+                    <a:p>
+                      <a:r>
+                        <a:rPr lang="en-US" dirty="0" smtClean="0"/>
+                        <a:t>Option Set</a:t>
+                      </a:r>
+                    </a:p>
+                    <a:p>
+                      <a:r>
+                        <a:rPr lang="en-US" dirty="0" smtClean="0"/>
+                        <a:t>Multi-Option</a:t>
+                      </a:r>
+                      <a:r>
+                        <a:rPr lang="en-US" baseline="0" dirty="0" smtClean="0"/>
+                        <a:t> Select</a:t>
+                      </a:r>
+                    </a:p>
+                    <a:p>
+                      <a:r>
+                        <a:rPr lang="en-US" baseline="0" dirty="0" smtClean="0"/>
+                        <a:t>Two Options</a:t>
+                      </a:r>
+                    </a:p>
+                    <a:p>
+                      <a:endParaRPr lang="en-US" dirty="0"/>
+                    </a:p>
+                  </a:txBody>
+                  <a:tcPr/>
+                </a:tc>
+              </a:tr>
+            </a:tbl>
+          </a:graphicData>
+        </a:graphic>
+      </p:graphicFrame>
+      <p:sp>
+        <p:nvSpPr>
+          <p:cNvPr id="5" name="TextBox 4"/>
+          <p:cNvSpPr txBox="1"/>
+          <p:nvPr/>
+        </p:nvSpPr>
+        <p:spPr>
+          <a:xfrm>
+            <a:off x="838200" y="3550024"/>
+            <a:ext cx="10515600" cy="923330"/>
+          </a:xfrm>
+          <a:prstGeom prst="rect">
+            <a:avLst/>
+          </a:prstGeom>
+          <a:noFill/>
+        </p:spPr>
+        <p:txBody>
+          <a:bodyPr wrap="square" rtlCol="0">
+            <a:spAutoFit/>
+          </a:bodyPr>
+          <a:lstStyle/>
+          <a:p>
+            <a:r>
+              <a:rPr lang="en-US" dirty="0" smtClean="0"/>
+              <a:t>Lookup: refer to another entity.</a:t>
+            </a:r>
+          </a:p>
+          <a:p>
+            <a:r>
+              <a:rPr lang="en-US" dirty="0" smtClean="0"/>
+              <a:t>Customer: refer to an account/contact.</a:t>
+            </a:r>
+          </a:p>
+          <a:p>
+            <a:r>
+              <a:rPr lang="en-US" dirty="0" smtClean="0"/>
+              <a:t>Whole Number: integer.</a:t>
+            </a:r>
+            <a:endParaRPr lang="en-US" dirty="0"/>
+          </a:p>
+        </p:txBody>
+      </p:sp>
+    </p:spTree>
+    <p:extLst>
+      <p:ext uri="{BB962C8B-B14F-4D97-AF65-F5344CB8AC3E}">
+        <p14:creationId xmlns:p14="http://schemas.microsoft.com/office/powerpoint/2010/main" val="1027911967"/>
+      </p:ext>
+    </p:extLst>
+  </p:cSld>
+  <p:clrMapOvr>
+    <a:masterClrMapping/>
+  </p:clrMapOvr>
+</p:sld>
+</file>
+
+<file path=ppt/slides/slide9.xml><?xml version="1.0" encoding="utf-8"?>
+<p:sld xmlns:a="http://schemas.openxmlformats.org/drawingml/2006/main" xmlns:r="http://schemas.openxmlformats.org/officeDocument/2006/relationships" xmlns:p="http://schemas.openxmlformats.org/presentationml/2006/main">
+  <p:cSld>
+    <p:spTree>
+      <p:nvGrpSpPr>
+        <p:cNvPr id="1" name=""/>
+        <p:cNvGrpSpPr/>
+        <p:nvPr/>
+      </p:nvGrpSpPr>
+      <p:grpSpPr>
+        <a:xfrm>
+          <a:off x="0" y="0"/>
+          <a:ext cx="0" cy="0"/>
+          <a:chOff x="0" y="0"/>
+          <a:chExt cx="0" cy="0"/>
+        </a:xfrm>
+      </p:grpSpPr>
+      <p:sp>
+        <p:nvSpPr>
+          <p:cNvPr id="2" name="Title 1"/>
+          <p:cNvSpPr>
+            <a:spLocks noGrp="1"/>
+          </p:cNvSpPr>
+          <p:nvPr>
+            <p:ph type="title"/>
+          </p:nvPr>
+        </p:nvSpPr>
+        <p:spPr/>
+        <p:txBody>
+          <a:bodyPr/>
+          <a:lstStyle/>
+          <a:p>
+            <a:r>
+              <a:rPr lang="en-US" dirty="0" smtClean="0"/>
+              <a:t>Customizing Entities</a:t>
+            </a:r>
+            <a:endParaRPr lang="en-US" dirty="0"/>
+          </a:p>
+        </p:txBody>
+      </p:sp>
+      <p:sp>
+        <p:nvSpPr>
+          <p:cNvPr id="3" name="Content Placeholder 2"/>
+          <p:cNvSpPr>
+            <a:spLocks noGrp="1"/>
+          </p:cNvSpPr>
+          <p:nvPr>
+            <p:ph idx="1"/>
+          </p:nvPr>
+        </p:nvSpPr>
+        <p:spPr/>
+        <p:txBody>
+          <a:bodyPr/>
+          <a:lstStyle/>
+          <a:p>
+            <a:r>
+              <a:rPr lang="en-US" dirty="0" smtClean="0"/>
+              <a:t>Types of entity.</a:t>
+            </a:r>
+          </a:p>
+          <a:p>
+            <a:r>
+              <a:rPr lang="en-US" dirty="0" smtClean="0"/>
+              <a:t>Key options.</a:t>
+            </a:r>
+          </a:p>
+          <a:p>
+            <a:r>
+              <a:rPr lang="en-US" dirty="0" smtClean="0"/>
+              <a:t>Entity for phone.</a:t>
+            </a:r>
+            <a:endParaRPr lang="en-US" dirty="0"/>
+          </a:p>
+        </p:txBody>
+      </p:sp>
+    </p:spTree>
+    <p:extLst>
+      <p:ext uri="{BB962C8B-B14F-4D97-AF65-F5344CB8AC3E}">
+        <p14:creationId xmlns:p14="http://schemas.microsoft.com/office/powerpoint/2010/main" val="1556045069"/>
       </p:ext>
     </p:extLst>
   </p:cSld>

</xml_diff>